<commit_message>
facade pattern related work added to presentation
</commit_message>
<xml_diff>
--- a/presentation/Presentation.pptx
+++ b/presentation/Presentation.pptx
@@ -4,12 +4,28 @@
   <p:sldMasterIdLst>
     <p:sldMasterId id="2147483648" r:id="rId1"/>
   </p:sldMasterIdLst>
+  <p:notesMasterIdLst>
+    <p:notesMasterId r:id="rId20"/>
+  </p:notesMasterIdLst>
   <p:sldIdLst>
     <p:sldId id="261" r:id="rId2"/>
-    <p:sldId id="257" r:id="rId3"/>
-    <p:sldId id="258" r:id="rId4"/>
-    <p:sldId id="259" r:id="rId5"/>
-    <p:sldId id="260" r:id="rId6"/>
+    <p:sldId id="263" r:id="rId3"/>
+    <p:sldId id="265" r:id="rId4"/>
+    <p:sldId id="274" r:id="rId5"/>
+    <p:sldId id="276" r:id="rId6"/>
+    <p:sldId id="275" r:id="rId7"/>
+    <p:sldId id="262" r:id="rId8"/>
+    <p:sldId id="257" r:id="rId9"/>
+    <p:sldId id="258" r:id="rId10"/>
+    <p:sldId id="259" r:id="rId11"/>
+    <p:sldId id="266" r:id="rId12"/>
+    <p:sldId id="267" r:id="rId13"/>
+    <p:sldId id="271" r:id="rId14"/>
+    <p:sldId id="268" r:id="rId15"/>
+    <p:sldId id="272" r:id="rId16"/>
+    <p:sldId id="273" r:id="rId17"/>
+    <p:sldId id="270" r:id="rId18"/>
+    <p:sldId id="269" r:id="rId19"/>
   </p:sldIdLst>
   <p:sldSz cx="9144000" cy="6858000" type="screen4x3"/>
   <p:notesSz cx="6858000" cy="9144000"/>
@@ -111,6 +127,762 @@
 </p:presentation>
 </file>
 
+<file path=ppt/notesMasters/notesMaster1.xml><?xml version="1.0" encoding="utf-8"?>
+<p:notesMaster xmlns:a="http://schemas.openxmlformats.org/drawingml/2006/main" xmlns:r="http://schemas.openxmlformats.org/officeDocument/2006/relationships" xmlns:p="http://schemas.openxmlformats.org/presentationml/2006/main">
+  <p:cSld>
+    <p:bg>
+      <p:bgRef idx="1001">
+        <a:schemeClr val="bg1"/>
+      </p:bgRef>
+    </p:bg>
+    <p:spTree>
+      <p:nvGrpSpPr>
+        <p:cNvPr id="1" name=""/>
+        <p:cNvGrpSpPr/>
+        <p:nvPr/>
+      </p:nvGrpSpPr>
+      <p:grpSpPr>
+        <a:xfrm>
+          <a:off x="0" y="0"/>
+          <a:ext cx="0" cy="0"/>
+          <a:chOff x="0" y="0"/>
+          <a:chExt cx="0" cy="0"/>
+        </a:xfrm>
+      </p:grpSpPr>
+      <p:sp>
+        <p:nvSpPr>
+          <p:cNvPr id="2" name="Header Placeholder 1"/>
+          <p:cNvSpPr>
+            <a:spLocks noGrp="1"/>
+          </p:cNvSpPr>
+          <p:nvPr>
+            <p:ph type="hdr" sz="quarter"/>
+          </p:nvPr>
+        </p:nvSpPr>
+        <p:spPr>
+          <a:xfrm>
+            <a:off x="0" y="0"/>
+            <a:ext cx="2971800" cy="457200"/>
+          </a:xfrm>
+          <a:prstGeom prst="rect">
+            <a:avLst/>
+          </a:prstGeom>
+        </p:spPr>
+        <p:txBody>
+          <a:bodyPr vert="horz" lIns="91440" tIns="45720" rIns="91440" bIns="45720" rtlCol="0"/>
+          <a:lstStyle>
+            <a:lvl1pPr algn="l">
+              <a:defRPr sz="1200"/>
+            </a:lvl1pPr>
+          </a:lstStyle>
+          <a:p>
+            <a:endParaRPr lang="en-IN"/>
+          </a:p>
+        </p:txBody>
+      </p:sp>
+      <p:sp>
+        <p:nvSpPr>
+          <p:cNvPr id="3" name="Date Placeholder 2"/>
+          <p:cNvSpPr>
+            <a:spLocks noGrp="1"/>
+          </p:cNvSpPr>
+          <p:nvPr>
+            <p:ph type="dt" idx="1"/>
+          </p:nvPr>
+        </p:nvSpPr>
+        <p:spPr>
+          <a:xfrm>
+            <a:off x="3884613" y="0"/>
+            <a:ext cx="2971800" cy="457200"/>
+          </a:xfrm>
+          <a:prstGeom prst="rect">
+            <a:avLst/>
+          </a:prstGeom>
+        </p:spPr>
+        <p:txBody>
+          <a:bodyPr vert="horz" lIns="91440" tIns="45720" rIns="91440" bIns="45720" rtlCol="0"/>
+          <a:lstStyle>
+            <a:lvl1pPr algn="r">
+              <a:defRPr sz="1200"/>
+            </a:lvl1pPr>
+          </a:lstStyle>
+          <a:p>
+            <a:fld id="{6C438111-C432-46FF-8793-1565524BEEF6}" type="datetimeFigureOut">
+              <a:rPr lang="en-IN" smtClean="0"/>
+              <a:t>03-09-2015</a:t>
+            </a:fld>
+            <a:endParaRPr lang="en-IN"/>
+          </a:p>
+        </p:txBody>
+      </p:sp>
+      <p:sp>
+        <p:nvSpPr>
+          <p:cNvPr id="4" name="Slide Image Placeholder 3"/>
+          <p:cNvSpPr>
+            <a:spLocks noGrp="1" noRot="1" noChangeAspect="1"/>
+          </p:cNvSpPr>
+          <p:nvPr>
+            <p:ph type="sldImg" idx="2"/>
+          </p:nvPr>
+        </p:nvSpPr>
+        <p:spPr>
+          <a:xfrm>
+            <a:off x="1143000" y="685800"/>
+            <a:ext cx="4572000" cy="3429000"/>
+          </a:xfrm>
+          <a:prstGeom prst="rect">
+            <a:avLst/>
+          </a:prstGeom>
+          <a:noFill/>
+          <a:ln w="12700">
+            <a:solidFill>
+              <a:prstClr val="black"/>
+            </a:solidFill>
+          </a:ln>
+        </p:spPr>
+        <p:txBody>
+          <a:bodyPr vert="horz" lIns="91440" tIns="45720" rIns="91440" bIns="45720" rtlCol="0" anchor="ctr"/>
+          <a:lstStyle/>
+          <a:p>
+            <a:endParaRPr lang="en-IN"/>
+          </a:p>
+        </p:txBody>
+      </p:sp>
+      <p:sp>
+        <p:nvSpPr>
+          <p:cNvPr id="5" name="Notes Placeholder 4"/>
+          <p:cNvSpPr>
+            <a:spLocks noGrp="1"/>
+          </p:cNvSpPr>
+          <p:nvPr>
+            <p:ph type="body" sz="quarter" idx="3"/>
+          </p:nvPr>
+        </p:nvSpPr>
+        <p:spPr>
+          <a:xfrm>
+            <a:off x="685800" y="4343400"/>
+            <a:ext cx="5486400" cy="4114800"/>
+          </a:xfrm>
+          <a:prstGeom prst="rect">
+            <a:avLst/>
+          </a:prstGeom>
+        </p:spPr>
+        <p:txBody>
+          <a:bodyPr vert="horz" lIns="91440" tIns="45720" rIns="91440" bIns="45720" rtlCol="0"/>
+          <a:lstStyle/>
+          <a:p>
+            <a:pPr lvl="0"/>
+            <a:r>
+              <a:rPr lang="en-US" smtClean="0"/>
+              <a:t>Click to edit Master text styles</a:t>
+            </a:r>
+          </a:p>
+          <a:p>
+            <a:pPr lvl="1"/>
+            <a:r>
+              <a:rPr lang="en-US" smtClean="0"/>
+              <a:t>Second level</a:t>
+            </a:r>
+          </a:p>
+          <a:p>
+            <a:pPr lvl="2"/>
+            <a:r>
+              <a:rPr lang="en-US" smtClean="0"/>
+              <a:t>Third level</a:t>
+            </a:r>
+          </a:p>
+          <a:p>
+            <a:pPr lvl="3"/>
+            <a:r>
+              <a:rPr lang="en-US" smtClean="0"/>
+              <a:t>Fourth level</a:t>
+            </a:r>
+          </a:p>
+          <a:p>
+            <a:pPr lvl="4"/>
+            <a:r>
+              <a:rPr lang="en-US" smtClean="0"/>
+              <a:t>Fifth level</a:t>
+            </a:r>
+            <a:endParaRPr lang="en-IN"/>
+          </a:p>
+        </p:txBody>
+      </p:sp>
+      <p:sp>
+        <p:nvSpPr>
+          <p:cNvPr id="6" name="Footer Placeholder 5"/>
+          <p:cNvSpPr>
+            <a:spLocks noGrp="1"/>
+          </p:cNvSpPr>
+          <p:nvPr>
+            <p:ph type="ftr" sz="quarter" idx="4"/>
+          </p:nvPr>
+        </p:nvSpPr>
+        <p:spPr>
+          <a:xfrm>
+            <a:off x="0" y="8685213"/>
+            <a:ext cx="2971800" cy="457200"/>
+          </a:xfrm>
+          <a:prstGeom prst="rect">
+            <a:avLst/>
+          </a:prstGeom>
+        </p:spPr>
+        <p:txBody>
+          <a:bodyPr vert="horz" lIns="91440" tIns="45720" rIns="91440" bIns="45720" rtlCol="0" anchor="b"/>
+          <a:lstStyle>
+            <a:lvl1pPr algn="l">
+              <a:defRPr sz="1200"/>
+            </a:lvl1pPr>
+          </a:lstStyle>
+          <a:p>
+            <a:endParaRPr lang="en-IN"/>
+          </a:p>
+        </p:txBody>
+      </p:sp>
+      <p:sp>
+        <p:nvSpPr>
+          <p:cNvPr id="7" name="Slide Number Placeholder 6"/>
+          <p:cNvSpPr>
+            <a:spLocks noGrp="1"/>
+          </p:cNvSpPr>
+          <p:nvPr>
+            <p:ph type="sldNum" sz="quarter" idx="5"/>
+          </p:nvPr>
+        </p:nvSpPr>
+        <p:spPr>
+          <a:xfrm>
+            <a:off x="3884613" y="8685213"/>
+            <a:ext cx="2971800" cy="457200"/>
+          </a:xfrm>
+          <a:prstGeom prst="rect">
+            <a:avLst/>
+          </a:prstGeom>
+        </p:spPr>
+        <p:txBody>
+          <a:bodyPr vert="horz" lIns="91440" tIns="45720" rIns="91440" bIns="45720" rtlCol="0" anchor="b"/>
+          <a:lstStyle>
+            <a:lvl1pPr algn="r">
+              <a:defRPr sz="1200"/>
+            </a:lvl1pPr>
+          </a:lstStyle>
+          <a:p>
+            <a:fld id="{2E6F462C-8C1D-4AA9-B47D-39005D4FA007}" type="slidenum">
+              <a:rPr lang="en-IN" smtClean="0"/>
+              <a:t>‹#›</a:t>
+            </a:fld>
+            <a:endParaRPr lang="en-IN"/>
+          </a:p>
+        </p:txBody>
+      </p:sp>
+    </p:spTree>
+    <p:extLst>
+      <p:ext uri="{BB962C8B-B14F-4D97-AF65-F5344CB8AC3E}">
+        <p14:creationId xmlns:p14="http://schemas.microsoft.com/office/powerpoint/2010/main" val="2757452598"/>
+      </p:ext>
+    </p:extLst>
+  </p:cSld>
+  <p:clrMap bg1="lt1" tx1="dk1" bg2="lt2" tx2="dk2" accent1="accent1" accent2="accent2" accent3="accent3" accent4="accent4" accent5="accent5" accent6="accent6" hlink="hlink" folHlink="folHlink"/>
+  <p:notesStyle>
+    <a:lvl1pPr marL="0" algn="l" defTabSz="914400" rtl="0" eaLnBrk="1" latinLnBrk="0" hangingPunct="1">
+      <a:defRPr sz="1200" kern="1200">
+        <a:solidFill>
+          <a:schemeClr val="tx1"/>
+        </a:solidFill>
+        <a:latin typeface="+mn-lt"/>
+        <a:ea typeface="+mn-ea"/>
+        <a:cs typeface="+mn-cs"/>
+      </a:defRPr>
+    </a:lvl1pPr>
+    <a:lvl2pPr marL="457200" algn="l" defTabSz="914400" rtl="0" eaLnBrk="1" latinLnBrk="0" hangingPunct="1">
+      <a:defRPr sz="1200" kern="1200">
+        <a:solidFill>
+          <a:schemeClr val="tx1"/>
+        </a:solidFill>
+        <a:latin typeface="+mn-lt"/>
+        <a:ea typeface="+mn-ea"/>
+        <a:cs typeface="+mn-cs"/>
+      </a:defRPr>
+    </a:lvl2pPr>
+    <a:lvl3pPr marL="914400" algn="l" defTabSz="914400" rtl="0" eaLnBrk="1" latinLnBrk="0" hangingPunct="1">
+      <a:defRPr sz="1200" kern="1200">
+        <a:solidFill>
+          <a:schemeClr val="tx1"/>
+        </a:solidFill>
+        <a:latin typeface="+mn-lt"/>
+        <a:ea typeface="+mn-ea"/>
+        <a:cs typeface="+mn-cs"/>
+      </a:defRPr>
+    </a:lvl3pPr>
+    <a:lvl4pPr marL="1371600" algn="l" defTabSz="914400" rtl="0" eaLnBrk="1" latinLnBrk="0" hangingPunct="1">
+      <a:defRPr sz="1200" kern="1200">
+        <a:solidFill>
+          <a:schemeClr val="tx1"/>
+        </a:solidFill>
+        <a:latin typeface="+mn-lt"/>
+        <a:ea typeface="+mn-ea"/>
+        <a:cs typeface="+mn-cs"/>
+      </a:defRPr>
+    </a:lvl4pPr>
+    <a:lvl5pPr marL="1828800" algn="l" defTabSz="914400" rtl="0" eaLnBrk="1" latinLnBrk="0" hangingPunct="1">
+      <a:defRPr sz="1200" kern="1200">
+        <a:solidFill>
+          <a:schemeClr val="tx1"/>
+        </a:solidFill>
+        <a:latin typeface="+mn-lt"/>
+        <a:ea typeface="+mn-ea"/>
+        <a:cs typeface="+mn-cs"/>
+      </a:defRPr>
+    </a:lvl5pPr>
+    <a:lvl6pPr marL="2286000" algn="l" defTabSz="914400" rtl="0" eaLnBrk="1" latinLnBrk="0" hangingPunct="1">
+      <a:defRPr sz="1200" kern="1200">
+        <a:solidFill>
+          <a:schemeClr val="tx1"/>
+        </a:solidFill>
+        <a:latin typeface="+mn-lt"/>
+        <a:ea typeface="+mn-ea"/>
+        <a:cs typeface="+mn-cs"/>
+      </a:defRPr>
+    </a:lvl6pPr>
+    <a:lvl7pPr marL="2743200" algn="l" defTabSz="914400" rtl="0" eaLnBrk="1" latinLnBrk="0" hangingPunct="1">
+      <a:defRPr sz="1200" kern="1200">
+        <a:solidFill>
+          <a:schemeClr val="tx1"/>
+        </a:solidFill>
+        <a:latin typeface="+mn-lt"/>
+        <a:ea typeface="+mn-ea"/>
+        <a:cs typeface="+mn-cs"/>
+      </a:defRPr>
+    </a:lvl7pPr>
+    <a:lvl8pPr marL="3200400" algn="l" defTabSz="914400" rtl="0" eaLnBrk="1" latinLnBrk="0" hangingPunct="1">
+      <a:defRPr sz="1200" kern="1200">
+        <a:solidFill>
+          <a:schemeClr val="tx1"/>
+        </a:solidFill>
+        <a:latin typeface="+mn-lt"/>
+        <a:ea typeface="+mn-ea"/>
+        <a:cs typeface="+mn-cs"/>
+      </a:defRPr>
+    </a:lvl8pPr>
+    <a:lvl9pPr marL="3657600" algn="l" defTabSz="914400" rtl="0" eaLnBrk="1" latinLnBrk="0" hangingPunct="1">
+      <a:defRPr sz="1200" kern="1200">
+        <a:solidFill>
+          <a:schemeClr val="tx1"/>
+        </a:solidFill>
+        <a:latin typeface="+mn-lt"/>
+        <a:ea typeface="+mn-ea"/>
+        <a:cs typeface="+mn-cs"/>
+      </a:defRPr>
+    </a:lvl9pPr>
+  </p:notesStyle>
+</p:notesMaster>
+</file>
+
+<file path=ppt/notesSlides/notesSlide1.xml><?xml version="1.0" encoding="utf-8"?>
+<p:notes xmlns:a="http://schemas.openxmlformats.org/drawingml/2006/main" xmlns:r="http://schemas.openxmlformats.org/officeDocument/2006/relationships" xmlns:p="http://schemas.openxmlformats.org/presentationml/2006/main">
+  <p:cSld>
+    <p:spTree>
+      <p:nvGrpSpPr>
+        <p:cNvPr id="1" name=""/>
+        <p:cNvGrpSpPr/>
+        <p:nvPr/>
+      </p:nvGrpSpPr>
+      <p:grpSpPr>
+        <a:xfrm>
+          <a:off x="0" y="0"/>
+          <a:ext cx="0" cy="0"/>
+          <a:chOff x="0" y="0"/>
+          <a:chExt cx="0" cy="0"/>
+        </a:xfrm>
+      </p:grpSpPr>
+      <p:sp>
+        <p:nvSpPr>
+          <p:cNvPr id="2" name="Slide Image Placeholder 1"/>
+          <p:cNvSpPr>
+            <a:spLocks noGrp="1" noRot="1" noChangeAspect="1"/>
+          </p:cNvSpPr>
+          <p:nvPr>
+            <p:ph type="sldImg"/>
+          </p:nvPr>
+        </p:nvSpPr>
+        <p:spPr/>
+      </p:sp>
+      <p:sp>
+        <p:nvSpPr>
+          <p:cNvPr id="3" name="Notes Placeholder 2"/>
+          <p:cNvSpPr>
+            <a:spLocks noGrp="1"/>
+          </p:cNvSpPr>
+          <p:nvPr>
+            <p:ph type="body" idx="1"/>
+          </p:nvPr>
+        </p:nvSpPr>
+        <p:spPr/>
+        <p:txBody>
+          <a:bodyPr/>
+          <a:lstStyle/>
+          <a:p>
+            <a:r>
+              <a:rPr lang="en-US" dirty="0" smtClean="0"/>
+              <a:t>provides a convenient higher-level interface to a larger body of code</a:t>
+            </a:r>
+          </a:p>
+          <a:p>
+            <a:r>
+              <a:rPr lang="en-US" dirty="0" smtClean="0"/>
+              <a:t>Hiding actual complexity</a:t>
+            </a:r>
+          </a:p>
+          <a:p>
+            <a:r>
+              <a:rPr lang="en-US" dirty="0" smtClean="0"/>
+              <a:t>Improves usability because of simplified presentation of API</a:t>
+            </a:r>
+          </a:p>
+          <a:p>
+            <a:r>
+              <a:rPr lang="en-US" dirty="0" smtClean="0"/>
+              <a:t>Not only simplifies the class interface, but also decouples class from code that utilizes it</a:t>
+            </a:r>
+          </a:p>
+        </p:txBody>
+      </p:sp>
+      <p:sp>
+        <p:nvSpPr>
+          <p:cNvPr id="4" name="Slide Number Placeholder 3"/>
+          <p:cNvSpPr>
+            <a:spLocks noGrp="1"/>
+          </p:cNvSpPr>
+          <p:nvPr>
+            <p:ph type="sldNum" sz="quarter" idx="10"/>
+          </p:nvPr>
+        </p:nvSpPr>
+        <p:spPr/>
+        <p:txBody>
+          <a:bodyPr/>
+          <a:lstStyle/>
+          <a:p>
+            <a:fld id="{2E6F462C-8C1D-4AA9-B47D-39005D4FA007}" type="slidenum">
+              <a:rPr lang="en-IN" smtClean="0"/>
+              <a:t>2</a:t>
+            </a:fld>
+            <a:endParaRPr lang="en-IN"/>
+          </a:p>
+        </p:txBody>
+      </p:sp>
+    </p:spTree>
+    <p:extLst>
+      <p:ext uri="{BB962C8B-B14F-4D97-AF65-F5344CB8AC3E}">
+        <p14:creationId xmlns:p14="http://schemas.microsoft.com/office/powerpoint/2010/main" val="4080085873"/>
+      </p:ext>
+    </p:extLst>
+  </p:cSld>
+  <p:clrMapOvr>
+    <a:masterClrMapping/>
+  </p:clrMapOvr>
+</p:notes>
+</file>
+
+<file path=ppt/notesSlides/notesSlide2.xml><?xml version="1.0" encoding="utf-8"?>
+<p:notes xmlns:a="http://schemas.openxmlformats.org/drawingml/2006/main" xmlns:r="http://schemas.openxmlformats.org/officeDocument/2006/relationships" xmlns:p="http://schemas.openxmlformats.org/presentationml/2006/main">
+  <p:cSld>
+    <p:spTree>
+      <p:nvGrpSpPr>
+        <p:cNvPr id="1" name=""/>
+        <p:cNvGrpSpPr/>
+        <p:nvPr/>
+      </p:nvGrpSpPr>
+      <p:grpSpPr>
+        <a:xfrm>
+          <a:off x="0" y="0"/>
+          <a:ext cx="0" cy="0"/>
+          <a:chOff x="0" y="0"/>
+          <a:chExt cx="0" cy="0"/>
+        </a:xfrm>
+      </p:grpSpPr>
+      <p:sp>
+        <p:nvSpPr>
+          <p:cNvPr id="2" name="Slide Image Placeholder 1"/>
+          <p:cNvSpPr>
+            <a:spLocks noGrp="1" noRot="1" noChangeAspect="1"/>
+          </p:cNvSpPr>
+          <p:nvPr>
+            <p:ph type="sldImg"/>
+          </p:nvPr>
+        </p:nvSpPr>
+        <p:spPr/>
+      </p:sp>
+      <p:sp>
+        <p:nvSpPr>
+          <p:cNvPr id="3" name="Notes Placeholder 2"/>
+          <p:cNvSpPr>
+            <a:spLocks noGrp="1"/>
+          </p:cNvSpPr>
+          <p:nvPr>
+            <p:ph type="body" idx="1"/>
+          </p:nvPr>
+        </p:nvSpPr>
+        <p:spPr/>
+        <p:txBody>
+          <a:bodyPr/>
+          <a:lstStyle/>
+          <a:p>
+            <a:r>
+              <a:rPr lang="en-US" dirty="0" smtClean="0"/>
+              <a:t>Being used by people knowingly or unknowingly in </a:t>
+            </a:r>
+            <a:r>
+              <a:rPr lang="en-US" dirty="0" err="1" smtClean="0"/>
+              <a:t>jQuery</a:t>
+            </a:r>
+            <a:endParaRPr lang="en-US" dirty="0" smtClean="0"/>
+          </a:p>
+          <a:p>
+            <a:r>
+              <a:rPr lang="en-US" dirty="0" err="1" smtClean="0"/>
+              <a:t>jQuery</a:t>
+            </a:r>
+            <a:r>
+              <a:rPr lang="en-US" dirty="0" smtClean="0"/>
+              <a:t> essentially serves as a group of facades to make our lives as programmers easier</a:t>
+            </a:r>
+          </a:p>
+        </p:txBody>
+      </p:sp>
+      <p:sp>
+        <p:nvSpPr>
+          <p:cNvPr id="4" name="Slide Number Placeholder 3"/>
+          <p:cNvSpPr>
+            <a:spLocks noGrp="1"/>
+          </p:cNvSpPr>
+          <p:nvPr>
+            <p:ph type="sldNum" sz="quarter" idx="10"/>
+          </p:nvPr>
+        </p:nvSpPr>
+        <p:spPr/>
+        <p:txBody>
+          <a:bodyPr/>
+          <a:lstStyle/>
+          <a:p>
+            <a:fld id="{2E6F462C-8C1D-4AA9-B47D-39005D4FA007}" type="slidenum">
+              <a:rPr lang="en-IN" smtClean="0"/>
+              <a:t>4</a:t>
+            </a:fld>
+            <a:endParaRPr lang="en-IN"/>
+          </a:p>
+        </p:txBody>
+      </p:sp>
+    </p:spTree>
+    <p:extLst>
+      <p:ext uri="{BB962C8B-B14F-4D97-AF65-F5344CB8AC3E}">
+        <p14:creationId xmlns:p14="http://schemas.microsoft.com/office/powerpoint/2010/main" val="3900142308"/>
+      </p:ext>
+    </p:extLst>
+  </p:cSld>
+  <p:clrMapOvr>
+    <a:masterClrMapping/>
+  </p:clrMapOvr>
+</p:notes>
+</file>
+
+<file path=ppt/notesSlides/notesSlide3.xml><?xml version="1.0" encoding="utf-8"?>
+<p:notes xmlns:a="http://schemas.openxmlformats.org/drawingml/2006/main" xmlns:r="http://schemas.openxmlformats.org/officeDocument/2006/relationships" xmlns:p="http://schemas.openxmlformats.org/presentationml/2006/main">
+  <p:cSld>
+    <p:spTree>
+      <p:nvGrpSpPr>
+        <p:cNvPr id="1" name=""/>
+        <p:cNvGrpSpPr/>
+        <p:nvPr/>
+      </p:nvGrpSpPr>
+      <p:grpSpPr>
+        <a:xfrm>
+          <a:off x="0" y="0"/>
+          <a:ext cx="0" cy="0"/>
+          <a:chOff x="0" y="0"/>
+          <a:chExt cx="0" cy="0"/>
+        </a:xfrm>
+      </p:grpSpPr>
+      <p:sp>
+        <p:nvSpPr>
+          <p:cNvPr id="2" name="Slide Image Placeholder 1"/>
+          <p:cNvSpPr>
+            <a:spLocks noGrp="1" noRot="1" noChangeAspect="1"/>
+          </p:cNvSpPr>
+          <p:nvPr>
+            <p:ph type="sldImg"/>
+          </p:nvPr>
+        </p:nvSpPr>
+        <p:spPr/>
+      </p:sp>
+      <p:sp>
+        <p:nvSpPr>
+          <p:cNvPr id="3" name="Notes Placeholder 2"/>
+          <p:cNvSpPr>
+            <a:spLocks noGrp="1"/>
+          </p:cNvSpPr>
+          <p:nvPr>
+            <p:ph type="body" idx="1"/>
+          </p:nvPr>
+        </p:nvSpPr>
+        <p:spPr/>
+        <p:txBody>
+          <a:bodyPr/>
+          <a:lstStyle/>
+          <a:p>
+            <a:r>
+              <a:rPr lang="en-US" dirty="0" smtClean="0"/>
+              <a:t>Being used by people knowingly or unknowingly in </a:t>
+            </a:r>
+            <a:r>
+              <a:rPr lang="en-US" dirty="0" err="1" smtClean="0"/>
+              <a:t>jQuery</a:t>
+            </a:r>
+            <a:endParaRPr lang="en-US" dirty="0" smtClean="0"/>
+          </a:p>
+          <a:p>
+            <a:r>
+              <a:rPr lang="en-US" dirty="0" err="1" smtClean="0"/>
+              <a:t>jQuery</a:t>
+            </a:r>
+            <a:r>
+              <a:rPr lang="en-US" dirty="0" smtClean="0"/>
+              <a:t> essentially serves as a group of facades to make our lives as programmers easier</a:t>
+            </a:r>
+          </a:p>
+        </p:txBody>
+      </p:sp>
+      <p:sp>
+        <p:nvSpPr>
+          <p:cNvPr id="4" name="Slide Number Placeholder 3"/>
+          <p:cNvSpPr>
+            <a:spLocks noGrp="1"/>
+          </p:cNvSpPr>
+          <p:nvPr>
+            <p:ph type="sldNum" sz="quarter" idx="10"/>
+          </p:nvPr>
+        </p:nvSpPr>
+        <p:spPr/>
+        <p:txBody>
+          <a:bodyPr/>
+          <a:lstStyle/>
+          <a:p>
+            <a:fld id="{2E6F462C-8C1D-4AA9-B47D-39005D4FA007}" type="slidenum">
+              <a:rPr lang="en-IN" smtClean="0"/>
+              <a:t>5</a:t>
+            </a:fld>
+            <a:endParaRPr lang="en-IN"/>
+          </a:p>
+        </p:txBody>
+      </p:sp>
+    </p:spTree>
+    <p:extLst>
+      <p:ext uri="{BB962C8B-B14F-4D97-AF65-F5344CB8AC3E}">
+        <p14:creationId xmlns:p14="http://schemas.microsoft.com/office/powerpoint/2010/main" val="3900142308"/>
+      </p:ext>
+    </p:extLst>
+  </p:cSld>
+  <p:clrMapOvr>
+    <a:masterClrMapping/>
+  </p:clrMapOvr>
+</p:notes>
+</file>
+
+<file path=ppt/notesSlides/notesSlide4.xml><?xml version="1.0" encoding="utf-8"?>
+<p:notes xmlns:a="http://schemas.openxmlformats.org/drawingml/2006/main" xmlns:r="http://schemas.openxmlformats.org/officeDocument/2006/relationships" xmlns:p="http://schemas.openxmlformats.org/presentationml/2006/main">
+  <p:cSld>
+    <p:spTree>
+      <p:nvGrpSpPr>
+        <p:cNvPr id="1" name=""/>
+        <p:cNvGrpSpPr/>
+        <p:nvPr/>
+      </p:nvGrpSpPr>
+      <p:grpSpPr>
+        <a:xfrm>
+          <a:off x="0" y="0"/>
+          <a:ext cx="0" cy="0"/>
+          <a:chOff x="0" y="0"/>
+          <a:chExt cx="0" cy="0"/>
+        </a:xfrm>
+      </p:grpSpPr>
+      <p:sp>
+        <p:nvSpPr>
+          <p:cNvPr id="2" name="Slide Image Placeholder 1"/>
+          <p:cNvSpPr>
+            <a:spLocks noGrp="1" noRot="1" noChangeAspect="1"/>
+          </p:cNvSpPr>
+          <p:nvPr>
+            <p:ph type="sldImg"/>
+          </p:nvPr>
+        </p:nvSpPr>
+        <p:spPr/>
+      </p:sp>
+      <p:sp>
+        <p:nvSpPr>
+          <p:cNvPr id="3" name="Notes Placeholder 2"/>
+          <p:cNvSpPr>
+            <a:spLocks noGrp="1"/>
+          </p:cNvSpPr>
+          <p:nvPr>
+            <p:ph type="body" idx="1"/>
+          </p:nvPr>
+        </p:nvSpPr>
+        <p:spPr/>
+        <p:txBody>
+          <a:bodyPr/>
+          <a:lstStyle/>
+          <a:p>
+            <a:r>
+              <a:rPr lang="en-US" dirty="0" smtClean="0"/>
+              <a:t>Simplify an interface for listening to events</a:t>
+            </a:r>
+          </a:p>
+          <a:p>
+            <a:endParaRPr lang="en-US" dirty="0" smtClean="0"/>
+          </a:p>
+          <a:p>
+            <a:r>
+              <a:rPr lang="en-US" dirty="0" smtClean="0"/>
+              <a:t>Create a common method that can be used in one’s code which does  the task of checking for the existence of features so that it can provide a safe and cross-browser compatible solution</a:t>
+            </a:r>
+            <a:endParaRPr lang="en-IN" dirty="0" smtClean="0"/>
+          </a:p>
+        </p:txBody>
+      </p:sp>
+      <p:sp>
+        <p:nvSpPr>
+          <p:cNvPr id="4" name="Slide Number Placeholder 3"/>
+          <p:cNvSpPr>
+            <a:spLocks noGrp="1"/>
+          </p:cNvSpPr>
+          <p:nvPr>
+            <p:ph type="sldNum" sz="quarter" idx="10"/>
+          </p:nvPr>
+        </p:nvSpPr>
+        <p:spPr/>
+        <p:txBody>
+          <a:bodyPr/>
+          <a:lstStyle/>
+          <a:p>
+            <a:fld id="{2E6F462C-8C1D-4AA9-B47D-39005D4FA007}" type="slidenum">
+              <a:rPr lang="en-IN" smtClean="0"/>
+              <a:t>13</a:t>
+            </a:fld>
+            <a:endParaRPr lang="en-IN"/>
+          </a:p>
+        </p:txBody>
+      </p:sp>
+    </p:spTree>
+    <p:extLst>
+      <p:ext uri="{BB962C8B-B14F-4D97-AF65-F5344CB8AC3E}">
+        <p14:creationId xmlns:p14="http://schemas.microsoft.com/office/powerpoint/2010/main" val="750880256"/>
+      </p:ext>
+    </p:extLst>
+  </p:cSld>
+  <p:clrMapOvr>
+    <a:masterClrMapping/>
+  </p:clrMapOvr>
+</p:notes>
+</file>
+
 <file path=ppt/slideLayouts/slideLayout1.xml><?xml version="1.0" encoding="utf-8"?>
 <p:sldLayout xmlns:a="http://schemas.openxmlformats.org/drawingml/2006/main" xmlns:r="http://schemas.openxmlformats.org/officeDocument/2006/relationships" xmlns:p="http://schemas.openxmlformats.org/presentationml/2006/main" type="title" preserve="1">
   <p:cSld name="Title Slide">
@@ -292,7 +1064,7 @@
           <a:p>
             <a:fld id="{B728563B-A159-4A5A-989C-8BF3F263C952}" type="datetimeFigureOut">
               <a:rPr lang="en-IN" smtClean="0"/>
-              <a:t>01-09-2015</a:t>
+              <a:t>02-09-2015</a:t>
             </a:fld>
             <a:endParaRPr lang="en-IN"/>
           </a:p>
@@ -462,7 +1234,7 @@
           <a:p>
             <a:fld id="{B728563B-A159-4A5A-989C-8BF3F263C952}" type="datetimeFigureOut">
               <a:rPr lang="en-IN" smtClean="0"/>
-              <a:t>01-09-2015</a:t>
+              <a:t>02-09-2015</a:t>
             </a:fld>
             <a:endParaRPr lang="en-IN"/>
           </a:p>
@@ -642,7 +1414,7 @@
           <a:p>
             <a:fld id="{B728563B-A159-4A5A-989C-8BF3F263C952}" type="datetimeFigureOut">
               <a:rPr lang="en-IN" smtClean="0"/>
-              <a:t>01-09-2015</a:t>
+              <a:t>02-09-2015</a:t>
             </a:fld>
             <a:endParaRPr lang="en-IN"/>
           </a:p>
@@ -812,7 +1584,7 @@
           <a:p>
             <a:fld id="{B728563B-A159-4A5A-989C-8BF3F263C952}" type="datetimeFigureOut">
               <a:rPr lang="en-IN" smtClean="0"/>
-              <a:t>01-09-2015</a:t>
+              <a:t>02-09-2015</a:t>
             </a:fld>
             <a:endParaRPr lang="en-IN"/>
           </a:p>
@@ -1058,7 +1830,7 @@
           <a:p>
             <a:fld id="{B728563B-A159-4A5A-989C-8BF3F263C952}" type="datetimeFigureOut">
               <a:rPr lang="en-IN" smtClean="0"/>
-              <a:t>01-09-2015</a:t>
+              <a:t>02-09-2015</a:t>
             </a:fld>
             <a:endParaRPr lang="en-IN"/>
           </a:p>
@@ -1346,7 +2118,7 @@
           <a:p>
             <a:fld id="{B728563B-A159-4A5A-989C-8BF3F263C952}" type="datetimeFigureOut">
               <a:rPr lang="en-IN" smtClean="0"/>
-              <a:t>01-09-2015</a:t>
+              <a:t>02-09-2015</a:t>
             </a:fld>
             <a:endParaRPr lang="en-IN"/>
           </a:p>
@@ -1768,7 +2540,7 @@
           <a:p>
             <a:fld id="{B728563B-A159-4A5A-989C-8BF3F263C952}" type="datetimeFigureOut">
               <a:rPr lang="en-IN" smtClean="0"/>
-              <a:t>01-09-2015</a:t>
+              <a:t>02-09-2015</a:t>
             </a:fld>
             <a:endParaRPr lang="en-IN"/>
           </a:p>
@@ -1886,7 +2658,7 @@
           <a:p>
             <a:fld id="{B728563B-A159-4A5A-989C-8BF3F263C952}" type="datetimeFigureOut">
               <a:rPr lang="en-IN" smtClean="0"/>
-              <a:t>01-09-2015</a:t>
+              <a:t>02-09-2015</a:t>
             </a:fld>
             <a:endParaRPr lang="en-IN"/>
           </a:p>
@@ -1981,7 +2753,7 @@
           <a:p>
             <a:fld id="{B728563B-A159-4A5A-989C-8BF3F263C952}" type="datetimeFigureOut">
               <a:rPr lang="en-IN" smtClean="0"/>
-              <a:t>01-09-2015</a:t>
+              <a:t>02-09-2015</a:t>
             </a:fld>
             <a:endParaRPr lang="en-IN"/>
           </a:p>
@@ -2258,7 +3030,7 @@
           <a:p>
             <a:fld id="{B728563B-A159-4A5A-989C-8BF3F263C952}" type="datetimeFigureOut">
               <a:rPr lang="en-IN" smtClean="0"/>
-              <a:t>01-09-2015</a:t>
+              <a:t>02-09-2015</a:t>
             </a:fld>
             <a:endParaRPr lang="en-IN"/>
           </a:p>
@@ -2511,7 +3283,7 @@
           <a:p>
             <a:fld id="{B728563B-A159-4A5A-989C-8BF3F263C952}" type="datetimeFigureOut">
               <a:rPr lang="en-IN" smtClean="0"/>
-              <a:t>01-09-2015</a:t>
+              <a:t>02-09-2015</a:t>
             </a:fld>
             <a:endParaRPr lang="en-IN"/>
           </a:p>
@@ -2724,7 +3496,7 @@
           <a:p>
             <a:fld id="{B728563B-A159-4A5A-989C-8BF3F263C952}" type="datetimeFigureOut">
               <a:rPr lang="en-IN" smtClean="0"/>
-              <a:t>01-09-2015</a:t>
+              <a:t>02-09-2015</a:t>
             </a:fld>
             <a:endParaRPr lang="en-IN"/>
           </a:p>
@@ -3117,35 +3889,14 @@
         </p:spPr>
         <p:txBody>
           <a:bodyPr>
-            <a:normAutofit fontScale="90000"/>
+            <a:normAutofit/>
           </a:bodyPr>
           <a:lstStyle/>
           <a:p>
             <a:r>
               <a:rPr lang="en-US" dirty="0" smtClean="0"/>
-              <a:t>Project – 1 :</a:t>
-            </a:r>
-            <a:br>
-              <a:rPr lang="en-US" dirty="0" smtClean="0"/>
-            </a:br>
-            <a:r>
-              <a:rPr lang="en-US" dirty="0" smtClean="0"/>
-              <a:t/>
-            </a:r>
-            <a:br>
-              <a:rPr lang="en-US" dirty="0" smtClean="0"/>
-            </a:br>
-            <a:r>
-              <a:rPr lang="en-IN" dirty="0" err="1" smtClean="0"/>
-              <a:t>drawr</a:t>
-            </a:r>
-            <a:r>
-              <a:rPr lang="en-IN" dirty="0" smtClean="0"/>
-              <a:t>-bootstrap</a:t>
-            </a:r>
-            <a:br>
-              <a:rPr lang="en-IN" dirty="0" smtClean="0"/>
-            </a:br>
+              <a:t>Façade Design Pattern</a:t>
+            </a:r>
             <a:endParaRPr lang="en-IN" dirty="0"/>
           </a:p>
         </p:txBody>
@@ -3154,6 +3905,1665 @@
     <p:extLst>
       <p:ext uri="{BB962C8B-B14F-4D97-AF65-F5344CB8AC3E}">
         <p14:creationId xmlns:p14="http://schemas.microsoft.com/office/powerpoint/2010/main" val="524117308"/>
+      </p:ext>
+    </p:extLst>
+  </p:cSld>
+  <p:clrMapOvr>
+    <a:masterClrMapping/>
+  </p:clrMapOvr>
+  <p:timing>
+    <p:tnLst>
+      <p:par>
+        <p:cTn id="1" dur="indefinite" restart="never" nodeType="tmRoot"/>
+      </p:par>
+    </p:tnLst>
+  </p:timing>
+</p:sld>
+</file>
+
+<file path=ppt/slides/slide10.xml><?xml version="1.0" encoding="utf-8"?>
+<p:sld xmlns:a="http://schemas.openxmlformats.org/drawingml/2006/main" xmlns:r="http://schemas.openxmlformats.org/officeDocument/2006/relationships" xmlns:p="http://schemas.openxmlformats.org/presentationml/2006/main">
+  <p:cSld>
+    <p:spTree>
+      <p:nvGrpSpPr>
+        <p:cNvPr id="1" name=""/>
+        <p:cNvGrpSpPr/>
+        <p:nvPr/>
+      </p:nvGrpSpPr>
+      <p:grpSpPr>
+        <a:xfrm>
+          <a:off x="0" y="0"/>
+          <a:ext cx="0" cy="0"/>
+          <a:chOff x="0" y="0"/>
+          <a:chExt cx="0" cy="0"/>
+        </a:xfrm>
+      </p:grpSpPr>
+      <p:sp>
+        <p:nvSpPr>
+          <p:cNvPr id="2" name="Title 1"/>
+          <p:cNvSpPr>
+            <a:spLocks noGrp="1"/>
+          </p:cNvSpPr>
+          <p:nvPr>
+            <p:ph type="title"/>
+          </p:nvPr>
+        </p:nvSpPr>
+        <p:spPr/>
+        <p:txBody>
+          <a:bodyPr/>
+          <a:lstStyle/>
+          <a:p>
+            <a:r>
+              <a:rPr lang="en-US" dirty="0" smtClean="0"/>
+              <a:t>Several event listeners &amp; handlers</a:t>
+            </a:r>
+            <a:endParaRPr lang="en-IN" dirty="0"/>
+          </a:p>
+        </p:txBody>
+      </p:sp>
+      <p:sp>
+        <p:nvSpPr>
+          <p:cNvPr id="3" name="Content Placeholder 2"/>
+          <p:cNvSpPr>
+            <a:spLocks noGrp="1"/>
+          </p:cNvSpPr>
+          <p:nvPr>
+            <p:ph idx="1"/>
+          </p:nvPr>
+        </p:nvSpPr>
+        <p:spPr/>
+        <p:txBody>
+          <a:bodyPr>
+            <a:normAutofit fontScale="70000" lnSpcReduction="20000"/>
+          </a:bodyPr>
+          <a:lstStyle/>
+          <a:p>
+            <a:r>
+              <a:rPr lang="en-IN" dirty="0" smtClean="0"/>
+              <a:t>$(</a:t>
+            </a:r>
+            <a:r>
+              <a:rPr lang="en-IN" b="1" dirty="0" smtClean="0"/>
+              <a:t>'#palette'</a:t>
+            </a:r>
+            <a:r>
+              <a:rPr lang="en-IN" dirty="0" smtClean="0"/>
+              <a:t>).on(</a:t>
+            </a:r>
+            <a:r>
+              <a:rPr lang="en-IN" b="1" dirty="0" smtClean="0"/>
+              <a:t>'click'</a:t>
+            </a:r>
+            <a:r>
+              <a:rPr lang="en-IN" dirty="0" smtClean="0"/>
+              <a:t>, </a:t>
+            </a:r>
+            <a:r>
+              <a:rPr lang="en-IN" b="1" dirty="0" smtClean="0"/>
+              <a:t>'li'</a:t>
+            </a:r>
+            <a:r>
+              <a:rPr lang="en-IN" dirty="0" smtClean="0"/>
+              <a:t>, </a:t>
+            </a:r>
+            <a:r>
+              <a:rPr lang="en-IN" b="1" dirty="0" smtClean="0"/>
+              <a:t>function </a:t>
+            </a:r>
+            <a:r>
+              <a:rPr lang="en-IN" dirty="0" smtClean="0"/>
+              <a:t>() {…}</a:t>
+            </a:r>
+            <a:endParaRPr lang="en-US" i="1" dirty="0" smtClean="0"/>
+          </a:p>
+          <a:p>
+            <a:r>
+              <a:rPr lang="en-US" dirty="0" smtClean="0"/>
+              <a:t>$(</a:t>
+            </a:r>
+            <a:r>
+              <a:rPr lang="en-US" b="1" dirty="0" smtClean="0"/>
+              <a:t>'#</a:t>
+            </a:r>
+            <a:r>
+              <a:rPr lang="en-US" b="1" dirty="0"/>
+              <a:t>erase'</a:t>
+            </a:r>
+            <a:r>
+              <a:rPr lang="en-US" dirty="0" smtClean="0"/>
+              <a:t>).</a:t>
+            </a:r>
+            <a:r>
+              <a:rPr lang="en-US" dirty="0"/>
+              <a:t>click</a:t>
+            </a:r>
+            <a:r>
+              <a:rPr lang="en-US" dirty="0" smtClean="0"/>
+              <a:t>(</a:t>
+            </a:r>
+            <a:r>
+              <a:rPr lang="en-US" b="1" dirty="0"/>
+              <a:t>function </a:t>
+            </a:r>
+            <a:r>
+              <a:rPr lang="en-US" dirty="0" smtClean="0"/>
+              <a:t>() { </a:t>
+            </a:r>
+            <a:r>
+              <a:rPr lang="en-US" i="1" dirty="0" smtClean="0"/>
+              <a:t>…</a:t>
+            </a:r>
+            <a:r>
+              <a:rPr lang="en-US" dirty="0" smtClean="0"/>
+              <a:t>}</a:t>
+            </a:r>
+          </a:p>
+          <a:p>
+            <a:r>
+              <a:rPr lang="en-IN" dirty="0" smtClean="0"/>
+              <a:t>$(</a:t>
+            </a:r>
+            <a:r>
+              <a:rPr lang="en-IN" b="1" dirty="0"/>
+              <a:t>'#thickness'</a:t>
+            </a:r>
+            <a:r>
+              <a:rPr lang="en-IN" dirty="0" smtClean="0"/>
+              <a:t>).change(</a:t>
+            </a:r>
+            <a:r>
+              <a:rPr lang="en-IN" b="1" dirty="0"/>
+              <a:t>function </a:t>
+            </a:r>
+            <a:r>
+              <a:rPr lang="en-IN" dirty="0" smtClean="0"/>
+              <a:t>() {…}</a:t>
+            </a:r>
+          </a:p>
+          <a:p>
+            <a:r>
+              <a:rPr lang="en-IN" dirty="0" smtClean="0"/>
+              <a:t>$(</a:t>
+            </a:r>
+            <a:r>
+              <a:rPr lang="en-IN" b="1" dirty="0"/>
+              <a:t>'#</a:t>
+            </a:r>
+            <a:r>
+              <a:rPr lang="en-IN" b="1" dirty="0" err="1"/>
+              <a:t>eraserthickness</a:t>
+            </a:r>
+            <a:r>
+              <a:rPr lang="en-IN" b="1" dirty="0"/>
+              <a:t>'</a:t>
+            </a:r>
+            <a:r>
+              <a:rPr lang="en-IN" dirty="0" smtClean="0"/>
+              <a:t>).change(</a:t>
+            </a:r>
+            <a:r>
+              <a:rPr lang="en-IN" b="1" dirty="0"/>
+              <a:t>function </a:t>
+            </a:r>
+            <a:r>
+              <a:rPr lang="en-IN" dirty="0" smtClean="0"/>
+              <a:t>() {…}</a:t>
+            </a:r>
+          </a:p>
+          <a:p>
+            <a:r>
+              <a:rPr lang="en-IN" dirty="0" smtClean="0"/>
+              <a:t>$(</a:t>
+            </a:r>
+            <a:r>
+              <a:rPr lang="en-IN" b="1" dirty="0"/>
+              <a:t>'#save'</a:t>
+            </a:r>
+            <a:r>
+              <a:rPr lang="en-IN" dirty="0" smtClean="0"/>
+              <a:t>).</a:t>
+            </a:r>
+            <a:r>
+              <a:rPr lang="en-IN" dirty="0"/>
+              <a:t>click</a:t>
+            </a:r>
+            <a:r>
+              <a:rPr lang="en-IN" dirty="0" smtClean="0"/>
+              <a:t>(</a:t>
+            </a:r>
+            <a:r>
+              <a:rPr lang="en-IN" b="1" dirty="0"/>
+              <a:t>function </a:t>
+            </a:r>
+            <a:r>
+              <a:rPr lang="en-IN" dirty="0" smtClean="0"/>
+              <a:t>() {…}</a:t>
+            </a:r>
+          </a:p>
+          <a:p>
+            <a:r>
+              <a:rPr lang="en-IN" dirty="0" smtClean="0"/>
+              <a:t>$(</a:t>
+            </a:r>
+            <a:r>
+              <a:rPr lang="en-IN" b="1" dirty="0"/>
+              <a:t>'#clear'</a:t>
+            </a:r>
+            <a:r>
+              <a:rPr lang="en-IN" dirty="0" smtClean="0"/>
+              <a:t>).</a:t>
+            </a:r>
+            <a:r>
+              <a:rPr lang="en-IN" dirty="0"/>
+              <a:t>click</a:t>
+            </a:r>
+            <a:r>
+              <a:rPr lang="en-IN" dirty="0" smtClean="0"/>
+              <a:t>(</a:t>
+            </a:r>
+            <a:r>
+              <a:rPr lang="en-IN" b="1" dirty="0"/>
+              <a:t>function </a:t>
+            </a:r>
+            <a:r>
+              <a:rPr lang="en-IN" dirty="0" smtClean="0"/>
+              <a:t>() {…}</a:t>
+            </a:r>
+          </a:p>
+          <a:p>
+            <a:r>
+              <a:rPr lang="en-IN" dirty="0" smtClean="0"/>
+              <a:t>$(</a:t>
+            </a:r>
+            <a:r>
+              <a:rPr lang="en-IN" b="1" dirty="0"/>
+              <a:t>'#</a:t>
+            </a:r>
+            <a:r>
+              <a:rPr lang="en-IN" b="1" dirty="0" err="1"/>
+              <a:t>addcolor</a:t>
+            </a:r>
+            <a:r>
+              <a:rPr lang="en-IN" b="1" dirty="0"/>
+              <a:t>'</a:t>
+            </a:r>
+            <a:r>
+              <a:rPr lang="en-IN" dirty="0" smtClean="0"/>
+              <a:t>).</a:t>
+            </a:r>
+            <a:r>
+              <a:rPr lang="en-IN" dirty="0"/>
+              <a:t>click</a:t>
+            </a:r>
+            <a:r>
+              <a:rPr lang="en-IN" dirty="0" smtClean="0"/>
+              <a:t>(</a:t>
+            </a:r>
+            <a:r>
+              <a:rPr lang="en-IN" b="1" dirty="0"/>
+              <a:t>function </a:t>
+            </a:r>
+            <a:r>
+              <a:rPr lang="en-IN" dirty="0" smtClean="0"/>
+              <a:t>() {…}</a:t>
+            </a:r>
+          </a:p>
+          <a:p>
+            <a:r>
+              <a:rPr lang="en-IN" dirty="0" smtClean="0"/>
+              <a:t>$(</a:t>
+            </a:r>
+            <a:r>
+              <a:rPr lang="en-IN" b="1" dirty="0"/>
+              <a:t>'#</a:t>
+            </a:r>
+            <a:r>
+              <a:rPr lang="en-IN" b="1" dirty="0" err="1"/>
+              <a:t>removecolor</a:t>
+            </a:r>
+            <a:r>
+              <a:rPr lang="en-IN" b="1" dirty="0"/>
+              <a:t>'</a:t>
+            </a:r>
+            <a:r>
+              <a:rPr lang="en-IN" dirty="0" smtClean="0"/>
+              <a:t>).</a:t>
+            </a:r>
+            <a:r>
+              <a:rPr lang="en-IN" dirty="0"/>
+              <a:t>click</a:t>
+            </a:r>
+            <a:r>
+              <a:rPr lang="en-IN" dirty="0" smtClean="0"/>
+              <a:t>(</a:t>
+            </a:r>
+            <a:r>
+              <a:rPr lang="en-IN" b="1" dirty="0"/>
+              <a:t>function </a:t>
+            </a:r>
+            <a:r>
+              <a:rPr lang="en-IN" dirty="0" smtClean="0"/>
+              <a:t>() {…}</a:t>
+            </a:r>
+          </a:p>
+          <a:p>
+            <a:r>
+              <a:rPr lang="en-IN" dirty="0" smtClean="0"/>
+              <a:t>$(</a:t>
+            </a:r>
+            <a:r>
+              <a:rPr lang="en-IN" b="1" dirty="0"/>
+              <a:t>'#</a:t>
+            </a:r>
+            <a:r>
+              <a:rPr lang="en-IN" b="1" dirty="0" err="1"/>
+              <a:t>attachcolor</a:t>
+            </a:r>
+            <a:r>
+              <a:rPr lang="en-IN" b="1" dirty="0"/>
+              <a:t>'</a:t>
+            </a:r>
+            <a:r>
+              <a:rPr lang="en-IN" dirty="0" smtClean="0"/>
+              <a:t>).</a:t>
+            </a:r>
+            <a:r>
+              <a:rPr lang="en-IN" dirty="0"/>
+              <a:t>click</a:t>
+            </a:r>
+            <a:r>
+              <a:rPr lang="en-IN" dirty="0" smtClean="0"/>
+              <a:t>(</a:t>
+            </a:r>
+            <a:r>
+              <a:rPr lang="en-IN" b="1" dirty="0"/>
+              <a:t>function </a:t>
+            </a:r>
+            <a:r>
+              <a:rPr lang="en-IN" dirty="0" smtClean="0"/>
+              <a:t>() {…}</a:t>
+            </a:r>
+          </a:p>
+          <a:p>
+            <a:r>
+              <a:rPr lang="en-IN" dirty="0" smtClean="0"/>
+              <a:t>$(</a:t>
+            </a:r>
+            <a:r>
+              <a:rPr lang="en-IN" b="1" dirty="0"/>
+              <a:t>'#</a:t>
+            </a:r>
+            <a:r>
+              <a:rPr lang="en-IN" b="1" dirty="0" err="1"/>
+              <a:t>cancelcolor</a:t>
+            </a:r>
+            <a:r>
+              <a:rPr lang="en-IN" b="1" dirty="0"/>
+              <a:t>'</a:t>
+            </a:r>
+            <a:r>
+              <a:rPr lang="en-IN" dirty="0" smtClean="0"/>
+              <a:t>).</a:t>
+            </a:r>
+            <a:r>
+              <a:rPr lang="en-IN" dirty="0"/>
+              <a:t>click</a:t>
+            </a:r>
+            <a:r>
+              <a:rPr lang="en-IN" dirty="0" smtClean="0"/>
+              <a:t>(</a:t>
+            </a:r>
+            <a:r>
+              <a:rPr lang="en-IN" b="1" dirty="0"/>
+              <a:t>function </a:t>
+            </a:r>
+            <a:r>
+              <a:rPr lang="en-IN" dirty="0" smtClean="0"/>
+              <a:t>() {…}</a:t>
+            </a:r>
+          </a:p>
+          <a:p>
+            <a:r>
+              <a:rPr lang="en-IN" dirty="0" smtClean="0"/>
+              <a:t>$(</a:t>
+            </a:r>
+            <a:r>
+              <a:rPr lang="en-IN" b="1" dirty="0"/>
+              <a:t>'.</a:t>
+            </a:r>
+            <a:r>
+              <a:rPr lang="en-IN" b="1" dirty="0" err="1"/>
+              <a:t>colorslider</a:t>
+            </a:r>
+            <a:r>
+              <a:rPr lang="en-IN" b="1" dirty="0"/>
+              <a:t>'</a:t>
+            </a:r>
+            <a:r>
+              <a:rPr lang="en-IN" dirty="0" smtClean="0"/>
+              <a:t>).change(</a:t>
+            </a:r>
+            <a:r>
+              <a:rPr lang="en-IN" b="1" dirty="0"/>
+              <a:t>function </a:t>
+            </a:r>
+            <a:r>
+              <a:rPr lang="en-IN" dirty="0" smtClean="0"/>
+              <a:t>() {…}</a:t>
+            </a:r>
+          </a:p>
+          <a:p>
+            <a:r>
+              <a:rPr lang="en-IN" dirty="0" err="1"/>
+              <a:t>paintSurface</a:t>
+            </a:r>
+            <a:r>
+              <a:rPr lang="en-IN" dirty="0" err="1" smtClean="0"/>
+              <a:t>.mousedown</a:t>
+            </a:r>
+            <a:r>
+              <a:rPr lang="en-IN" dirty="0" smtClean="0"/>
+              <a:t>(</a:t>
+            </a:r>
+            <a:r>
+              <a:rPr lang="en-IN" b="1" dirty="0"/>
+              <a:t>function </a:t>
+            </a:r>
+            <a:r>
+              <a:rPr lang="en-IN" dirty="0" smtClean="0"/>
+              <a:t>(e) {…}</a:t>
+            </a:r>
+          </a:p>
+          <a:p>
+            <a:r>
+              <a:rPr lang="en-IN" dirty="0" err="1" smtClean="0">
+                <a:effectLst/>
+              </a:rPr>
+              <a:t>paintSurface</a:t>
+            </a:r>
+            <a:r>
+              <a:rPr lang="en-IN" dirty="0" err="1" smtClean="0"/>
+              <a:t>.mousemove</a:t>
+            </a:r>
+            <a:r>
+              <a:rPr lang="en-IN" dirty="0" smtClean="0"/>
+              <a:t>(</a:t>
+            </a:r>
+            <a:r>
+              <a:rPr lang="en-IN" b="1" dirty="0"/>
+              <a:t>function </a:t>
+            </a:r>
+            <a:r>
+              <a:rPr lang="en-IN" dirty="0" smtClean="0"/>
+              <a:t>(e) {…}</a:t>
+            </a:r>
+          </a:p>
+        </p:txBody>
+      </p:sp>
+    </p:spTree>
+    <p:extLst>
+      <p:ext uri="{BB962C8B-B14F-4D97-AF65-F5344CB8AC3E}">
+        <p14:creationId xmlns:p14="http://schemas.microsoft.com/office/powerpoint/2010/main" val="3653693353"/>
+      </p:ext>
+    </p:extLst>
+  </p:cSld>
+  <p:clrMapOvr>
+    <a:masterClrMapping/>
+  </p:clrMapOvr>
+  <p:timing>
+    <p:tnLst>
+      <p:par>
+        <p:cTn id="1" dur="indefinite" restart="never" nodeType="tmRoot"/>
+      </p:par>
+    </p:tnLst>
+  </p:timing>
+</p:sld>
+</file>
+
+<file path=ppt/slides/slide11.xml><?xml version="1.0" encoding="utf-8"?>
+<p:sld xmlns:a="http://schemas.openxmlformats.org/drawingml/2006/main" xmlns:r="http://schemas.openxmlformats.org/officeDocument/2006/relationships" xmlns:p="http://schemas.openxmlformats.org/presentationml/2006/main">
+  <p:cSld>
+    <p:spTree>
+      <p:nvGrpSpPr>
+        <p:cNvPr id="1" name=""/>
+        <p:cNvGrpSpPr/>
+        <p:nvPr/>
+      </p:nvGrpSpPr>
+      <p:grpSpPr>
+        <a:xfrm>
+          <a:off x="0" y="0"/>
+          <a:ext cx="0" cy="0"/>
+          <a:chOff x="0" y="0"/>
+          <a:chExt cx="0" cy="0"/>
+        </a:xfrm>
+      </p:grpSpPr>
+      <p:sp>
+        <p:nvSpPr>
+          <p:cNvPr id="2" name="Title 1"/>
+          <p:cNvSpPr>
+            <a:spLocks noGrp="1"/>
+          </p:cNvSpPr>
+          <p:nvPr>
+            <p:ph type="title"/>
+          </p:nvPr>
+        </p:nvSpPr>
+        <p:spPr/>
+        <p:txBody>
+          <a:bodyPr/>
+          <a:lstStyle/>
+          <a:p>
+            <a:r>
+              <a:rPr lang="en-US" dirty="0" smtClean="0"/>
+              <a:t>Original Version</a:t>
+            </a:r>
+            <a:endParaRPr lang="en-IN" dirty="0"/>
+          </a:p>
+        </p:txBody>
+      </p:sp>
+      <p:pic>
+        <p:nvPicPr>
+          <p:cNvPr id="3075" name="Picture 3" descr="D:\Informatics\Seminar\My Workspace\Seminar_Repository\presentation\Images\event listeners original.png"/>
+          <p:cNvPicPr>
+            <a:picLocks noChangeAspect="1" noChangeArrowheads="1"/>
+          </p:cNvPicPr>
+          <p:nvPr/>
+        </p:nvPicPr>
+        <p:blipFill>
+          <a:blip r:embed="rId2">
+            <a:extLst>
+              <a:ext uri="{28A0092B-C50C-407E-A947-70E740481C1C}">
+                <a14:useLocalDpi xmlns:a14="http://schemas.microsoft.com/office/drawing/2010/main" val="0"/>
+              </a:ext>
+            </a:extLst>
+          </a:blip>
+          <a:srcRect/>
+          <a:stretch>
+            <a:fillRect/>
+          </a:stretch>
+        </p:blipFill>
+        <p:spPr bwMode="auto">
+          <a:xfrm>
+            <a:off x="838200" y="1600200"/>
+            <a:ext cx="7523163" cy="4582561"/>
+          </a:xfrm>
+          <a:prstGeom prst="rect">
+            <a:avLst/>
+          </a:prstGeom>
+          <a:noFill/>
+          <a:extLst>
+            <a:ext uri="{909E8E84-426E-40DD-AFC4-6F175D3DCCD1}">
+              <a14:hiddenFill xmlns:a14="http://schemas.microsoft.com/office/drawing/2010/main">
+                <a:solidFill>
+                  <a:srgbClr val="FFFFFF"/>
+                </a:solidFill>
+              </a14:hiddenFill>
+            </a:ext>
+          </a:extLst>
+        </p:spPr>
+      </p:pic>
+      <p:sp>
+        <p:nvSpPr>
+          <p:cNvPr id="4" name="TextBox 3"/>
+          <p:cNvSpPr txBox="1"/>
+          <p:nvPr/>
+        </p:nvSpPr>
+        <p:spPr>
+          <a:xfrm>
+            <a:off x="6400800" y="2362200"/>
+            <a:ext cx="756938" cy="369332"/>
+          </a:xfrm>
+          <a:prstGeom prst="rect">
+            <a:avLst/>
+          </a:prstGeom>
+          <a:noFill/>
+        </p:spPr>
+        <p:txBody>
+          <a:bodyPr wrap="none" rtlCol="0">
+            <a:spAutoFit/>
+          </a:bodyPr>
+          <a:lstStyle/>
+          <a:p>
+            <a:r>
+              <a:rPr lang="en-US" b="1" dirty="0">
+                <a:solidFill>
+                  <a:srgbClr val="FF0000"/>
+                </a:solidFill>
+              </a:rPr>
+              <a:t>a</a:t>
+            </a:r>
+            <a:r>
+              <a:rPr lang="en-US" b="1" dirty="0" smtClean="0">
+                <a:solidFill>
+                  <a:srgbClr val="FF0000"/>
+                </a:solidFill>
+              </a:rPr>
+              <a:t>pp.js</a:t>
+            </a:r>
+            <a:endParaRPr lang="en-IN" b="1" dirty="0">
+              <a:solidFill>
+                <a:srgbClr val="FF0000"/>
+              </a:solidFill>
+            </a:endParaRPr>
+          </a:p>
+        </p:txBody>
+      </p:sp>
+    </p:spTree>
+    <p:extLst>
+      <p:ext uri="{BB962C8B-B14F-4D97-AF65-F5344CB8AC3E}">
+        <p14:creationId xmlns:p14="http://schemas.microsoft.com/office/powerpoint/2010/main" val="1332823870"/>
+      </p:ext>
+    </p:extLst>
+  </p:cSld>
+  <p:clrMapOvr>
+    <a:masterClrMapping/>
+  </p:clrMapOvr>
+  <p:timing>
+    <p:tnLst>
+      <p:par>
+        <p:cTn id="1" dur="indefinite" restart="never" nodeType="tmRoot"/>
+      </p:par>
+    </p:tnLst>
+  </p:timing>
+</p:sld>
+</file>
+
+<file path=ppt/slides/slide12.xml><?xml version="1.0" encoding="utf-8"?>
+<p:sld xmlns:a="http://schemas.openxmlformats.org/drawingml/2006/main" xmlns:r="http://schemas.openxmlformats.org/officeDocument/2006/relationships" xmlns:p="http://schemas.openxmlformats.org/presentationml/2006/main">
+  <p:cSld>
+    <p:spTree>
+      <p:nvGrpSpPr>
+        <p:cNvPr id="1" name=""/>
+        <p:cNvGrpSpPr/>
+        <p:nvPr/>
+      </p:nvGrpSpPr>
+      <p:grpSpPr>
+        <a:xfrm>
+          <a:off x="0" y="0"/>
+          <a:ext cx="0" cy="0"/>
+          <a:chOff x="0" y="0"/>
+          <a:chExt cx="0" cy="0"/>
+        </a:xfrm>
+      </p:grpSpPr>
+      <p:sp>
+        <p:nvSpPr>
+          <p:cNvPr id="2" name="Title 1"/>
+          <p:cNvSpPr>
+            <a:spLocks noGrp="1"/>
+          </p:cNvSpPr>
+          <p:nvPr>
+            <p:ph type="title"/>
+          </p:nvPr>
+        </p:nvSpPr>
+        <p:spPr>
+          <a:xfrm>
+            <a:off x="457200" y="228600"/>
+            <a:ext cx="8229600" cy="1143000"/>
+          </a:xfrm>
+        </p:spPr>
+        <p:txBody>
+          <a:bodyPr/>
+          <a:lstStyle/>
+          <a:p>
+            <a:r>
+              <a:rPr lang="en-US" dirty="0" smtClean="0"/>
+              <a:t>Limitations</a:t>
+            </a:r>
+            <a:endParaRPr lang="en-IN" dirty="0"/>
+          </a:p>
+        </p:txBody>
+      </p:sp>
+      <p:sp>
+        <p:nvSpPr>
+          <p:cNvPr id="3" name="Content Placeholder 2"/>
+          <p:cNvSpPr>
+            <a:spLocks noGrp="1"/>
+          </p:cNvSpPr>
+          <p:nvPr>
+            <p:ph idx="1"/>
+          </p:nvPr>
+        </p:nvSpPr>
+        <p:spPr>
+          <a:xfrm>
+            <a:off x="457200" y="1295400"/>
+            <a:ext cx="8229600" cy="4525963"/>
+          </a:xfrm>
+        </p:spPr>
+        <p:txBody>
+          <a:bodyPr/>
+          <a:lstStyle/>
+          <a:p>
+            <a:r>
+              <a:rPr lang="en-US" dirty="0" smtClean="0"/>
+              <a:t>All event listeners/handlers defined in a single function</a:t>
+            </a:r>
+          </a:p>
+          <a:p>
+            <a:r>
+              <a:rPr lang="en-US" dirty="0" smtClean="0"/>
+              <a:t>Confusing! </a:t>
+            </a:r>
+            <a:r>
+              <a:rPr lang="en-US" dirty="0"/>
+              <a:t>No </a:t>
+            </a:r>
+            <a:r>
+              <a:rPr lang="en-US" dirty="0" smtClean="0"/>
+              <a:t>abstraction</a:t>
+            </a:r>
+          </a:p>
+          <a:p>
+            <a:r>
+              <a:rPr lang="en-US" dirty="0" smtClean="0"/>
+              <a:t>Browsers’ compatibility not checked</a:t>
+            </a:r>
+            <a:endParaRPr lang="en-IN" dirty="0"/>
+          </a:p>
+        </p:txBody>
+      </p:sp>
+      <p:pic>
+        <p:nvPicPr>
+          <p:cNvPr id="4" name="Picture 3" descr="D:\Informatics\Seminar\My Workspace\Seminar_Repository\presentation\Images\event listeners original.png"/>
+          <p:cNvPicPr>
+            <a:picLocks noChangeAspect="1" noChangeArrowheads="1"/>
+          </p:cNvPicPr>
+          <p:nvPr/>
+        </p:nvPicPr>
+        <p:blipFill>
+          <a:blip r:embed="rId2">
+            <a:extLst>
+              <a:ext uri="{28A0092B-C50C-407E-A947-70E740481C1C}">
+                <a14:useLocalDpi xmlns:a14="http://schemas.microsoft.com/office/drawing/2010/main" val="0"/>
+              </a:ext>
+            </a:extLst>
+          </a:blip>
+          <a:srcRect/>
+          <a:stretch>
+            <a:fillRect/>
+          </a:stretch>
+        </p:blipFill>
+        <p:spPr bwMode="auto">
+          <a:xfrm>
+            <a:off x="3810000" y="3581400"/>
+            <a:ext cx="5146318" cy="3134761"/>
+          </a:xfrm>
+          <a:prstGeom prst="rect">
+            <a:avLst/>
+          </a:prstGeom>
+          <a:noFill/>
+          <a:extLst>
+            <a:ext uri="{909E8E84-426E-40DD-AFC4-6F175D3DCCD1}">
+              <a14:hiddenFill xmlns:a14="http://schemas.microsoft.com/office/drawing/2010/main">
+                <a:solidFill>
+                  <a:srgbClr val="FFFFFF"/>
+                </a:solidFill>
+              </a14:hiddenFill>
+            </a:ext>
+          </a:extLst>
+        </p:spPr>
+      </p:pic>
+      <p:sp>
+        <p:nvSpPr>
+          <p:cNvPr id="5" name="TextBox 4"/>
+          <p:cNvSpPr txBox="1"/>
+          <p:nvPr/>
+        </p:nvSpPr>
+        <p:spPr>
+          <a:xfrm>
+            <a:off x="2900662" y="6260068"/>
+            <a:ext cx="756938" cy="369332"/>
+          </a:xfrm>
+          <a:prstGeom prst="rect">
+            <a:avLst/>
+          </a:prstGeom>
+          <a:noFill/>
+        </p:spPr>
+        <p:txBody>
+          <a:bodyPr wrap="none" rtlCol="0">
+            <a:spAutoFit/>
+          </a:bodyPr>
+          <a:lstStyle/>
+          <a:p>
+            <a:r>
+              <a:rPr lang="en-US" b="1" dirty="0">
+                <a:solidFill>
+                  <a:srgbClr val="FF0000"/>
+                </a:solidFill>
+              </a:rPr>
+              <a:t>a</a:t>
+            </a:r>
+            <a:r>
+              <a:rPr lang="en-US" b="1" dirty="0" smtClean="0">
+                <a:solidFill>
+                  <a:srgbClr val="FF0000"/>
+                </a:solidFill>
+              </a:rPr>
+              <a:t>pp.js</a:t>
+            </a:r>
+            <a:endParaRPr lang="en-IN" b="1" dirty="0">
+              <a:solidFill>
+                <a:srgbClr val="FF0000"/>
+              </a:solidFill>
+            </a:endParaRPr>
+          </a:p>
+        </p:txBody>
+      </p:sp>
+    </p:spTree>
+    <p:extLst>
+      <p:ext uri="{BB962C8B-B14F-4D97-AF65-F5344CB8AC3E}">
+        <p14:creationId xmlns:p14="http://schemas.microsoft.com/office/powerpoint/2010/main" val="3609036823"/>
+      </p:ext>
+    </p:extLst>
+  </p:cSld>
+  <p:clrMapOvr>
+    <a:masterClrMapping/>
+  </p:clrMapOvr>
+  <p:timing>
+    <p:tnLst>
+      <p:par>
+        <p:cTn id="1" dur="indefinite" restart="never" nodeType="tmRoot"/>
+      </p:par>
+    </p:tnLst>
+  </p:timing>
+</p:sld>
+</file>
+
+<file path=ppt/slides/slide13.xml><?xml version="1.0" encoding="utf-8"?>
+<p:sld xmlns:a="http://schemas.openxmlformats.org/drawingml/2006/main" xmlns:r="http://schemas.openxmlformats.org/officeDocument/2006/relationships" xmlns:p="http://schemas.openxmlformats.org/presentationml/2006/main">
+  <p:cSld>
+    <p:spTree>
+      <p:nvGrpSpPr>
+        <p:cNvPr id="1" name=""/>
+        <p:cNvGrpSpPr/>
+        <p:nvPr/>
+      </p:nvGrpSpPr>
+      <p:grpSpPr>
+        <a:xfrm>
+          <a:off x="0" y="0"/>
+          <a:ext cx="0" cy="0"/>
+          <a:chOff x="0" y="0"/>
+          <a:chExt cx="0" cy="0"/>
+        </a:xfrm>
+      </p:grpSpPr>
+      <p:sp>
+        <p:nvSpPr>
+          <p:cNvPr id="2" name="Title 1"/>
+          <p:cNvSpPr>
+            <a:spLocks noGrp="1"/>
+          </p:cNvSpPr>
+          <p:nvPr>
+            <p:ph type="title"/>
+          </p:nvPr>
+        </p:nvSpPr>
+        <p:spPr/>
+        <p:txBody>
+          <a:bodyPr/>
+          <a:lstStyle/>
+          <a:p>
+            <a:r>
+              <a:rPr lang="en-US" dirty="0" smtClean="0"/>
+              <a:t>Façade utilized</a:t>
+            </a:r>
+            <a:endParaRPr lang="en-IN" dirty="0"/>
+          </a:p>
+        </p:txBody>
+      </p:sp>
+      <p:sp>
+        <p:nvSpPr>
+          <p:cNvPr id="3" name="Content Placeholder 2"/>
+          <p:cNvSpPr>
+            <a:spLocks noGrp="1"/>
+          </p:cNvSpPr>
+          <p:nvPr>
+            <p:ph idx="1"/>
+          </p:nvPr>
+        </p:nvSpPr>
+        <p:spPr/>
+        <p:txBody>
+          <a:bodyPr/>
+          <a:lstStyle/>
+          <a:p>
+            <a:r>
+              <a:rPr lang="en-US" dirty="0" smtClean="0"/>
+              <a:t>Simplify an interface for </a:t>
+            </a:r>
+            <a:r>
+              <a:rPr lang="en-US" dirty="0"/>
+              <a:t>listening </a:t>
+            </a:r>
+            <a:r>
+              <a:rPr lang="en-US" dirty="0" smtClean="0"/>
+              <a:t>to events</a:t>
+            </a:r>
+          </a:p>
+          <a:p>
+            <a:endParaRPr lang="en-US" dirty="0" smtClean="0"/>
+          </a:p>
+          <a:p>
+            <a:r>
+              <a:rPr lang="en-US" dirty="0"/>
+              <a:t>C</a:t>
+            </a:r>
+            <a:r>
+              <a:rPr lang="en-US" dirty="0" smtClean="0"/>
+              <a:t>ommon </a:t>
+            </a:r>
+            <a:r>
+              <a:rPr lang="en-US" dirty="0"/>
+              <a:t>method </a:t>
+            </a:r>
+            <a:r>
+              <a:rPr lang="en-US" dirty="0" smtClean="0"/>
+              <a:t>to provide safe </a:t>
+            </a:r>
+            <a:r>
+              <a:rPr lang="en-US" dirty="0"/>
+              <a:t>and </a:t>
+            </a:r>
+            <a:r>
+              <a:rPr lang="en-US" dirty="0" smtClean="0"/>
+              <a:t>cross-browser compatible solution</a:t>
+            </a:r>
+            <a:endParaRPr lang="en-IN" dirty="0"/>
+          </a:p>
+        </p:txBody>
+      </p:sp>
+    </p:spTree>
+    <p:extLst>
+      <p:ext uri="{BB962C8B-B14F-4D97-AF65-F5344CB8AC3E}">
+        <p14:creationId xmlns:p14="http://schemas.microsoft.com/office/powerpoint/2010/main" val="1575493216"/>
+      </p:ext>
+    </p:extLst>
+  </p:cSld>
+  <p:clrMapOvr>
+    <a:masterClrMapping/>
+  </p:clrMapOvr>
+  <p:timing>
+    <p:tnLst>
+      <p:par>
+        <p:cTn id="1" dur="indefinite" restart="never" nodeType="tmRoot"/>
+      </p:par>
+    </p:tnLst>
+  </p:timing>
+</p:sld>
+</file>
+
+<file path=ppt/slides/slide14.xml><?xml version="1.0" encoding="utf-8"?>
+<p:sld xmlns:a="http://schemas.openxmlformats.org/drawingml/2006/main" xmlns:r="http://schemas.openxmlformats.org/officeDocument/2006/relationships" xmlns:p="http://schemas.openxmlformats.org/presentationml/2006/main">
+  <p:cSld>
+    <p:spTree>
+      <p:nvGrpSpPr>
+        <p:cNvPr id="1" name=""/>
+        <p:cNvGrpSpPr/>
+        <p:nvPr/>
+      </p:nvGrpSpPr>
+      <p:grpSpPr>
+        <a:xfrm>
+          <a:off x="0" y="0"/>
+          <a:ext cx="0" cy="0"/>
+          <a:chOff x="0" y="0"/>
+          <a:chExt cx="0" cy="0"/>
+        </a:xfrm>
+      </p:grpSpPr>
+      <p:sp>
+        <p:nvSpPr>
+          <p:cNvPr id="2" name="Title 1"/>
+          <p:cNvSpPr>
+            <a:spLocks noGrp="1"/>
+          </p:cNvSpPr>
+          <p:nvPr>
+            <p:ph type="title"/>
+          </p:nvPr>
+        </p:nvSpPr>
+        <p:spPr/>
+        <p:txBody>
+          <a:bodyPr>
+            <a:normAutofit fontScale="90000"/>
+          </a:bodyPr>
+          <a:lstStyle/>
+          <a:p>
+            <a:r>
+              <a:rPr lang="en-US" dirty="0"/>
+              <a:t>a simple facade that masks the various browser-specific methods</a:t>
+            </a:r>
+            <a:endParaRPr lang="en-IN" dirty="0"/>
+          </a:p>
+        </p:txBody>
+      </p:sp>
+      <p:pic>
+        <p:nvPicPr>
+          <p:cNvPr id="4099" name="Picture 3" descr="D:\Informatics\Seminar\My Workspace\Seminar_Repository\presentation\Images\cross browser event listeners.png"/>
+          <p:cNvPicPr>
+            <a:picLocks noChangeAspect="1" noChangeArrowheads="1"/>
+          </p:cNvPicPr>
+          <p:nvPr/>
+        </p:nvPicPr>
+        <p:blipFill>
+          <a:blip r:embed="rId2">
+            <a:extLst>
+              <a:ext uri="{28A0092B-C50C-407E-A947-70E740481C1C}">
+                <a14:useLocalDpi xmlns:a14="http://schemas.microsoft.com/office/drawing/2010/main" val="0"/>
+              </a:ext>
+            </a:extLst>
+          </a:blip>
+          <a:srcRect/>
+          <a:stretch>
+            <a:fillRect/>
+          </a:stretch>
+        </p:blipFill>
+        <p:spPr bwMode="auto">
+          <a:xfrm>
+            <a:off x="304800" y="2438400"/>
+            <a:ext cx="8515645" cy="2438400"/>
+          </a:xfrm>
+          <a:prstGeom prst="rect">
+            <a:avLst/>
+          </a:prstGeom>
+          <a:noFill/>
+          <a:extLst>
+            <a:ext uri="{909E8E84-426E-40DD-AFC4-6F175D3DCCD1}">
+              <a14:hiddenFill xmlns:a14="http://schemas.microsoft.com/office/drawing/2010/main">
+                <a:solidFill>
+                  <a:srgbClr val="FFFFFF"/>
+                </a:solidFill>
+              </a14:hiddenFill>
+            </a:ext>
+          </a:extLst>
+        </p:spPr>
+      </p:pic>
+      <p:sp>
+        <p:nvSpPr>
+          <p:cNvPr id="8" name="TextBox 7"/>
+          <p:cNvSpPr txBox="1"/>
+          <p:nvPr/>
+        </p:nvSpPr>
+        <p:spPr>
+          <a:xfrm>
+            <a:off x="3962400" y="4953000"/>
+            <a:ext cx="756938" cy="369332"/>
+          </a:xfrm>
+          <a:prstGeom prst="rect">
+            <a:avLst/>
+          </a:prstGeom>
+          <a:noFill/>
+        </p:spPr>
+        <p:txBody>
+          <a:bodyPr wrap="none" rtlCol="0">
+            <a:spAutoFit/>
+          </a:bodyPr>
+          <a:lstStyle/>
+          <a:p>
+            <a:r>
+              <a:rPr lang="en-US" b="1" dirty="0">
+                <a:solidFill>
+                  <a:srgbClr val="FF0000"/>
+                </a:solidFill>
+              </a:rPr>
+              <a:t>a</a:t>
+            </a:r>
+            <a:r>
+              <a:rPr lang="en-US" b="1" dirty="0" smtClean="0">
+                <a:solidFill>
+                  <a:srgbClr val="FF0000"/>
+                </a:solidFill>
+              </a:rPr>
+              <a:t>pp.js</a:t>
+            </a:r>
+            <a:endParaRPr lang="en-IN" b="1" dirty="0">
+              <a:solidFill>
+                <a:srgbClr val="FF0000"/>
+              </a:solidFill>
+            </a:endParaRPr>
+          </a:p>
+        </p:txBody>
+      </p:sp>
+    </p:spTree>
+    <p:extLst>
+      <p:ext uri="{BB962C8B-B14F-4D97-AF65-F5344CB8AC3E}">
+        <p14:creationId xmlns:p14="http://schemas.microsoft.com/office/powerpoint/2010/main" val="1378810574"/>
+      </p:ext>
+    </p:extLst>
+  </p:cSld>
+  <p:clrMapOvr>
+    <a:masterClrMapping/>
+  </p:clrMapOvr>
+  <p:timing>
+    <p:tnLst>
+      <p:par>
+        <p:cTn id="1" dur="indefinite" restart="never" nodeType="tmRoot"/>
+      </p:par>
+    </p:tnLst>
+  </p:timing>
+</p:sld>
+</file>
+
+<file path=ppt/slides/slide15.xml><?xml version="1.0" encoding="utf-8"?>
+<p:sld xmlns:a="http://schemas.openxmlformats.org/drawingml/2006/main" xmlns:r="http://schemas.openxmlformats.org/officeDocument/2006/relationships" xmlns:p="http://schemas.openxmlformats.org/presentationml/2006/main">
+  <p:cSld>
+    <p:spTree>
+      <p:nvGrpSpPr>
+        <p:cNvPr id="1" name=""/>
+        <p:cNvGrpSpPr/>
+        <p:nvPr/>
+      </p:nvGrpSpPr>
+      <p:grpSpPr>
+        <a:xfrm>
+          <a:off x="0" y="0"/>
+          <a:ext cx="0" cy="0"/>
+          <a:chOff x="0" y="0"/>
+          <a:chExt cx="0" cy="0"/>
+        </a:xfrm>
+      </p:grpSpPr>
+      <p:pic>
+        <p:nvPicPr>
+          <p:cNvPr id="5" name="Picture 3" descr="D:\Informatics\Seminar\My Workspace\Seminar_Repository\presentation\Images\cross browser event listeners.png"/>
+          <p:cNvPicPr>
+            <a:picLocks noChangeAspect="1" noChangeArrowheads="1"/>
+          </p:cNvPicPr>
+          <p:nvPr/>
+        </p:nvPicPr>
+        <p:blipFill>
+          <a:blip r:embed="rId2">
+            <a:extLst>
+              <a:ext uri="{28A0092B-C50C-407E-A947-70E740481C1C}">
+                <a14:useLocalDpi xmlns:a14="http://schemas.microsoft.com/office/drawing/2010/main" val="0"/>
+              </a:ext>
+            </a:extLst>
+          </a:blip>
+          <a:srcRect/>
+          <a:stretch>
+            <a:fillRect/>
+          </a:stretch>
+        </p:blipFill>
+        <p:spPr bwMode="auto">
+          <a:xfrm>
+            <a:off x="94955" y="304800"/>
+            <a:ext cx="7448845" cy="2132929"/>
+          </a:xfrm>
+          <a:prstGeom prst="rect">
+            <a:avLst/>
+          </a:prstGeom>
+          <a:noFill/>
+          <a:extLst>
+            <a:ext uri="{909E8E84-426E-40DD-AFC4-6F175D3DCCD1}">
+              <a14:hiddenFill xmlns:a14="http://schemas.microsoft.com/office/drawing/2010/main">
+                <a:solidFill>
+                  <a:srgbClr val="FFFFFF"/>
+                </a:solidFill>
+              </a14:hiddenFill>
+            </a:ext>
+          </a:extLst>
+        </p:spPr>
+      </p:pic>
+      <p:pic>
+        <p:nvPicPr>
+          <p:cNvPr id="6148" name="Picture 4" descr="D:\Informatics\Seminar\My Workspace\Seminar_Repository\presentation\Images\event listeners refactored.png"/>
+          <p:cNvPicPr>
+            <a:picLocks noChangeAspect="1" noChangeArrowheads="1"/>
+          </p:cNvPicPr>
+          <p:nvPr/>
+        </p:nvPicPr>
+        <p:blipFill>
+          <a:blip r:embed="rId3">
+            <a:extLst>
+              <a:ext uri="{28A0092B-C50C-407E-A947-70E740481C1C}">
+                <a14:useLocalDpi xmlns:a14="http://schemas.microsoft.com/office/drawing/2010/main" val="0"/>
+              </a:ext>
+            </a:extLst>
+          </a:blip>
+          <a:srcRect/>
+          <a:stretch>
+            <a:fillRect/>
+          </a:stretch>
+        </p:blipFill>
+        <p:spPr bwMode="auto">
+          <a:xfrm>
+            <a:off x="3951287" y="2579687"/>
+            <a:ext cx="4964113" cy="4049713"/>
+          </a:xfrm>
+          <a:prstGeom prst="rect">
+            <a:avLst/>
+          </a:prstGeom>
+          <a:noFill/>
+          <a:extLst>
+            <a:ext uri="{909E8E84-426E-40DD-AFC4-6F175D3DCCD1}">
+              <a14:hiddenFill xmlns:a14="http://schemas.microsoft.com/office/drawing/2010/main">
+                <a:solidFill>
+                  <a:srgbClr val="FFFFFF"/>
+                </a:solidFill>
+              </a14:hiddenFill>
+            </a:ext>
+          </a:extLst>
+        </p:spPr>
+      </p:pic>
+      <p:sp>
+        <p:nvSpPr>
+          <p:cNvPr id="8" name="TextBox 7"/>
+          <p:cNvSpPr txBox="1"/>
+          <p:nvPr/>
+        </p:nvSpPr>
+        <p:spPr>
+          <a:xfrm>
+            <a:off x="1981200" y="3288268"/>
+            <a:ext cx="756938" cy="369332"/>
+          </a:xfrm>
+          <a:prstGeom prst="rect">
+            <a:avLst/>
+          </a:prstGeom>
+          <a:noFill/>
+        </p:spPr>
+        <p:txBody>
+          <a:bodyPr wrap="none" rtlCol="0">
+            <a:spAutoFit/>
+          </a:bodyPr>
+          <a:lstStyle/>
+          <a:p>
+            <a:r>
+              <a:rPr lang="en-US" b="1" dirty="0">
+                <a:solidFill>
+                  <a:srgbClr val="FF0000"/>
+                </a:solidFill>
+              </a:rPr>
+              <a:t>a</a:t>
+            </a:r>
+            <a:r>
+              <a:rPr lang="en-US" b="1" dirty="0" smtClean="0">
+                <a:solidFill>
+                  <a:srgbClr val="FF0000"/>
+                </a:solidFill>
+              </a:rPr>
+              <a:t>pp.js</a:t>
+            </a:r>
+            <a:endParaRPr lang="en-IN" b="1" dirty="0">
+              <a:solidFill>
+                <a:srgbClr val="FF0000"/>
+              </a:solidFill>
+            </a:endParaRPr>
+          </a:p>
+        </p:txBody>
+      </p:sp>
+    </p:spTree>
+    <p:extLst>
+      <p:ext uri="{BB962C8B-B14F-4D97-AF65-F5344CB8AC3E}">
+        <p14:creationId xmlns:p14="http://schemas.microsoft.com/office/powerpoint/2010/main" val="822525222"/>
+      </p:ext>
+    </p:extLst>
+  </p:cSld>
+  <p:clrMapOvr>
+    <a:masterClrMapping/>
+  </p:clrMapOvr>
+  <p:timing>
+    <p:tnLst>
+      <p:par>
+        <p:cTn id="1" dur="indefinite" restart="never" nodeType="tmRoot"/>
+      </p:par>
+    </p:tnLst>
+  </p:timing>
+</p:sld>
+</file>
+
+<file path=ppt/slides/slide16.xml><?xml version="1.0" encoding="utf-8"?>
+<p:sld xmlns:a="http://schemas.openxmlformats.org/drawingml/2006/main" xmlns:r="http://schemas.openxmlformats.org/officeDocument/2006/relationships" xmlns:p="http://schemas.openxmlformats.org/presentationml/2006/main">
+  <p:cSld>
+    <p:spTree>
+      <p:nvGrpSpPr>
+        <p:cNvPr id="1" name=""/>
+        <p:cNvGrpSpPr/>
+        <p:nvPr/>
+      </p:nvGrpSpPr>
+      <p:grpSpPr>
+        <a:xfrm>
+          <a:off x="0" y="0"/>
+          <a:ext cx="0" cy="0"/>
+          <a:chOff x="0" y="0"/>
+          <a:chExt cx="0" cy="0"/>
+        </a:xfrm>
+      </p:grpSpPr>
+      <p:sp>
+        <p:nvSpPr>
+          <p:cNvPr id="2" name="Title 1"/>
+          <p:cNvSpPr>
+            <a:spLocks noGrp="1"/>
+          </p:cNvSpPr>
+          <p:nvPr>
+            <p:ph type="title"/>
+          </p:nvPr>
+        </p:nvSpPr>
+        <p:spPr>
+          <a:xfrm>
+            <a:off x="457200" y="152400"/>
+            <a:ext cx="8229600" cy="1143000"/>
+          </a:xfrm>
+        </p:spPr>
+        <p:txBody>
+          <a:bodyPr/>
+          <a:lstStyle/>
+          <a:p>
+            <a:r>
+              <a:rPr lang="en-US" dirty="0" smtClean="0"/>
+              <a:t>Achieving abstraction</a:t>
+            </a:r>
+            <a:endParaRPr lang="en-IN" dirty="0"/>
+          </a:p>
+        </p:txBody>
+      </p:sp>
+      <p:pic>
+        <p:nvPicPr>
+          <p:cNvPr id="7170" name="Picture 2" descr="D:\Informatics\Seminar\My Workspace\Seminar_Repository\presentation\Images\event handlers defined - refactored.png"/>
+          <p:cNvPicPr>
+            <a:picLocks noChangeAspect="1" noChangeArrowheads="1"/>
+          </p:cNvPicPr>
+          <p:nvPr/>
+        </p:nvPicPr>
+        <p:blipFill>
+          <a:blip r:embed="rId2">
+            <a:extLst>
+              <a:ext uri="{28A0092B-C50C-407E-A947-70E740481C1C}">
+                <a14:useLocalDpi xmlns:a14="http://schemas.microsoft.com/office/drawing/2010/main" val="0"/>
+              </a:ext>
+            </a:extLst>
+          </a:blip>
+          <a:srcRect/>
+          <a:stretch>
+            <a:fillRect/>
+          </a:stretch>
+        </p:blipFill>
+        <p:spPr bwMode="auto">
+          <a:xfrm>
+            <a:off x="1552574" y="1390650"/>
+            <a:ext cx="5838826" cy="5391150"/>
+          </a:xfrm>
+          <a:prstGeom prst="rect">
+            <a:avLst/>
+          </a:prstGeom>
+          <a:noFill/>
+          <a:extLst>
+            <a:ext uri="{909E8E84-426E-40DD-AFC4-6F175D3DCCD1}">
+              <a14:hiddenFill xmlns:a14="http://schemas.microsoft.com/office/drawing/2010/main">
+                <a:solidFill>
+                  <a:srgbClr val="FFFFFF"/>
+                </a:solidFill>
+              </a14:hiddenFill>
+            </a:ext>
+          </a:extLst>
+        </p:spPr>
+      </p:pic>
+      <p:sp>
+        <p:nvSpPr>
+          <p:cNvPr id="5" name="TextBox 4"/>
+          <p:cNvSpPr txBox="1"/>
+          <p:nvPr/>
+        </p:nvSpPr>
+        <p:spPr>
+          <a:xfrm>
+            <a:off x="6786862" y="3288268"/>
+            <a:ext cx="1673856" cy="369332"/>
+          </a:xfrm>
+          <a:prstGeom prst="rect">
+            <a:avLst/>
+          </a:prstGeom>
+          <a:noFill/>
+        </p:spPr>
+        <p:txBody>
+          <a:bodyPr wrap="none" rtlCol="0">
+            <a:spAutoFit/>
+          </a:bodyPr>
+          <a:lstStyle/>
+          <a:p>
+            <a:r>
+              <a:rPr lang="en-US" b="1" dirty="0" smtClean="0">
+                <a:solidFill>
+                  <a:srgbClr val="FF0000"/>
+                </a:solidFill>
+              </a:rPr>
+              <a:t>eventHandler.js</a:t>
+            </a:r>
+            <a:endParaRPr lang="en-IN" b="1" dirty="0">
+              <a:solidFill>
+                <a:srgbClr val="FF0000"/>
+              </a:solidFill>
+            </a:endParaRPr>
+          </a:p>
+        </p:txBody>
+      </p:sp>
+    </p:spTree>
+    <p:extLst>
+      <p:ext uri="{BB962C8B-B14F-4D97-AF65-F5344CB8AC3E}">
+        <p14:creationId xmlns:p14="http://schemas.microsoft.com/office/powerpoint/2010/main" val="3062602138"/>
+      </p:ext>
+    </p:extLst>
+  </p:cSld>
+  <p:clrMapOvr>
+    <a:masterClrMapping/>
+  </p:clrMapOvr>
+  <p:timing>
+    <p:tnLst>
+      <p:par>
+        <p:cTn id="1" dur="indefinite" restart="never" nodeType="tmRoot"/>
+      </p:par>
+    </p:tnLst>
+  </p:timing>
+</p:sld>
+</file>
+
+<file path=ppt/slides/slide17.xml><?xml version="1.0" encoding="utf-8"?>
+<p:sld xmlns:a="http://schemas.openxmlformats.org/drawingml/2006/main" xmlns:r="http://schemas.openxmlformats.org/officeDocument/2006/relationships" xmlns:p="http://schemas.openxmlformats.org/presentationml/2006/main">
+  <p:cSld>
+    <p:spTree>
+      <p:nvGrpSpPr>
+        <p:cNvPr id="1" name=""/>
+        <p:cNvGrpSpPr/>
+        <p:nvPr/>
+      </p:nvGrpSpPr>
+      <p:grpSpPr>
+        <a:xfrm>
+          <a:off x="0" y="0"/>
+          <a:ext cx="0" cy="0"/>
+          <a:chOff x="0" y="0"/>
+          <a:chExt cx="0" cy="0"/>
+        </a:xfrm>
+      </p:grpSpPr>
+      <p:sp>
+        <p:nvSpPr>
+          <p:cNvPr id="2" name="Title 1"/>
+          <p:cNvSpPr>
+            <a:spLocks noGrp="1"/>
+          </p:cNvSpPr>
+          <p:nvPr>
+            <p:ph type="title"/>
+          </p:nvPr>
+        </p:nvSpPr>
+        <p:spPr/>
+        <p:txBody>
+          <a:bodyPr>
+            <a:normAutofit fontScale="90000"/>
+          </a:bodyPr>
+          <a:lstStyle/>
+          <a:p>
+            <a:r>
+              <a:rPr lang="en-US" dirty="0"/>
+              <a:t>a simple facade that masks the various browser-specific methods</a:t>
+            </a:r>
+            <a:endParaRPr lang="en-IN" dirty="0"/>
+          </a:p>
+        </p:txBody>
+      </p:sp>
+      <p:pic>
+        <p:nvPicPr>
+          <p:cNvPr id="4100" name="Picture 4" descr="D:\Informatics\Seminar\My Workspace\Seminar_Repository\presentation\Images\addEventListener supported browsers.png"/>
+          <p:cNvPicPr>
+            <a:picLocks noChangeAspect="1" noChangeArrowheads="1"/>
+          </p:cNvPicPr>
+          <p:nvPr/>
+        </p:nvPicPr>
+        <p:blipFill>
+          <a:blip r:embed="rId2">
+            <a:extLst>
+              <a:ext uri="{28A0092B-C50C-407E-A947-70E740481C1C}">
+                <a14:useLocalDpi xmlns:a14="http://schemas.microsoft.com/office/drawing/2010/main" val="0"/>
+              </a:ext>
+            </a:extLst>
+          </a:blip>
+          <a:srcRect/>
+          <a:stretch>
+            <a:fillRect/>
+          </a:stretch>
+        </p:blipFill>
+        <p:spPr bwMode="auto">
+          <a:xfrm>
+            <a:off x="872114" y="4856018"/>
+            <a:ext cx="6858001" cy="847725"/>
+          </a:xfrm>
+          <a:prstGeom prst="rect">
+            <a:avLst/>
+          </a:prstGeom>
+          <a:noFill/>
+          <a:extLst>
+            <a:ext uri="{909E8E84-426E-40DD-AFC4-6F175D3DCCD1}">
+              <a14:hiddenFill xmlns:a14="http://schemas.microsoft.com/office/drawing/2010/main">
+                <a:solidFill>
+                  <a:srgbClr val="FFFFFF"/>
+                </a:solidFill>
+              </a14:hiddenFill>
+            </a:ext>
+          </a:extLst>
+        </p:spPr>
+      </p:pic>
+      <p:pic>
+        <p:nvPicPr>
+          <p:cNvPr id="5122" name="Picture 2" descr="D:\Informatics\Seminar\My Workspace\Seminar_Repository\presentation\Images\addEventListener marked.png"/>
+          <p:cNvPicPr>
+            <a:picLocks noChangeAspect="1" noChangeArrowheads="1"/>
+          </p:cNvPicPr>
+          <p:nvPr/>
+        </p:nvPicPr>
+        <p:blipFill>
+          <a:blip r:embed="rId3">
+            <a:extLst>
+              <a:ext uri="{28A0092B-C50C-407E-A947-70E740481C1C}">
+                <a14:useLocalDpi xmlns:a14="http://schemas.microsoft.com/office/drawing/2010/main" val="0"/>
+              </a:ext>
+            </a:extLst>
+          </a:blip>
+          <a:srcRect/>
+          <a:stretch>
+            <a:fillRect/>
+          </a:stretch>
+        </p:blipFill>
+        <p:spPr bwMode="auto">
+          <a:xfrm>
+            <a:off x="228600" y="1820141"/>
+            <a:ext cx="8647113" cy="2476500"/>
+          </a:xfrm>
+          <a:prstGeom prst="rect">
+            <a:avLst/>
+          </a:prstGeom>
+          <a:noFill/>
+          <a:extLst>
+            <a:ext uri="{909E8E84-426E-40DD-AFC4-6F175D3DCCD1}">
+              <a14:hiddenFill xmlns:a14="http://schemas.microsoft.com/office/drawing/2010/main">
+                <a:solidFill>
+                  <a:srgbClr val="FFFFFF"/>
+                </a:solidFill>
+              </a14:hiddenFill>
+            </a:ext>
+          </a:extLst>
+        </p:spPr>
+      </p:pic>
+    </p:spTree>
+    <p:extLst>
+      <p:ext uri="{BB962C8B-B14F-4D97-AF65-F5344CB8AC3E}">
+        <p14:creationId xmlns:p14="http://schemas.microsoft.com/office/powerpoint/2010/main" val="260565279"/>
+      </p:ext>
+    </p:extLst>
+  </p:cSld>
+  <p:clrMapOvr>
+    <a:masterClrMapping/>
+  </p:clrMapOvr>
+  <p:timing>
+    <p:tnLst>
+      <p:par>
+        <p:cTn id="1" dur="indefinite" restart="never" nodeType="tmRoot"/>
+      </p:par>
+    </p:tnLst>
+  </p:timing>
+</p:sld>
+</file>
+
+<file path=ppt/slides/slide18.xml><?xml version="1.0" encoding="utf-8"?>
+<p:sld xmlns:a="http://schemas.openxmlformats.org/drawingml/2006/main" xmlns:r="http://schemas.openxmlformats.org/officeDocument/2006/relationships" xmlns:p="http://schemas.openxmlformats.org/presentationml/2006/main">
+  <p:cSld>
+    <p:spTree>
+      <p:nvGrpSpPr>
+        <p:cNvPr id="1" name=""/>
+        <p:cNvGrpSpPr/>
+        <p:nvPr/>
+      </p:nvGrpSpPr>
+      <p:grpSpPr>
+        <a:xfrm>
+          <a:off x="0" y="0"/>
+          <a:ext cx="0" cy="0"/>
+          <a:chOff x="0" y="0"/>
+          <a:chExt cx="0" cy="0"/>
+        </a:xfrm>
+      </p:grpSpPr>
+      <p:sp>
+        <p:nvSpPr>
+          <p:cNvPr id="2" name="Title 1"/>
+          <p:cNvSpPr>
+            <a:spLocks noGrp="1"/>
+          </p:cNvSpPr>
+          <p:nvPr>
+            <p:ph type="title"/>
+          </p:nvPr>
+        </p:nvSpPr>
+        <p:spPr/>
+        <p:txBody>
+          <a:bodyPr/>
+          <a:lstStyle/>
+          <a:p>
+            <a:r>
+              <a:rPr lang="en-US" dirty="0" smtClean="0"/>
+              <a:t>References</a:t>
+            </a:r>
+            <a:endParaRPr lang="en-IN" dirty="0"/>
+          </a:p>
+        </p:txBody>
+      </p:sp>
+      <p:sp>
+        <p:nvSpPr>
+          <p:cNvPr id="3" name="Content Placeholder 2"/>
+          <p:cNvSpPr>
+            <a:spLocks noGrp="1"/>
+          </p:cNvSpPr>
+          <p:nvPr>
+            <p:ph idx="1"/>
+          </p:nvPr>
+        </p:nvSpPr>
+        <p:spPr/>
+        <p:txBody>
+          <a:bodyPr/>
+          <a:lstStyle/>
+          <a:p>
+            <a:r>
+              <a:rPr lang="en-US" dirty="0">
+                <a:hlinkClick r:id="rId2"/>
+              </a:rPr>
+              <a:t>w</a:t>
+            </a:r>
+            <a:r>
+              <a:rPr lang="en-US" dirty="0" smtClean="0">
+                <a:hlinkClick r:id="rId2"/>
+              </a:rPr>
+              <a:t>3schools</a:t>
+            </a:r>
+            <a:endParaRPr lang="en-IN" dirty="0"/>
+          </a:p>
+        </p:txBody>
+      </p:sp>
+    </p:spTree>
+    <p:extLst>
+      <p:ext uri="{BB962C8B-B14F-4D97-AF65-F5344CB8AC3E}">
+        <p14:creationId xmlns:p14="http://schemas.microsoft.com/office/powerpoint/2010/main" val="169586914"/>
       </p:ext>
     </p:extLst>
   </p:cSld>
@@ -3189,113 +5599,85 @@
       </p:grpSpPr>
       <p:sp>
         <p:nvSpPr>
-          <p:cNvPr id="2" name="Title 1"/>
-          <p:cNvSpPr>
-            <a:spLocks noGrp="1"/>
-          </p:cNvSpPr>
-          <p:nvPr>
-            <p:ph type="title"/>
-          </p:nvPr>
-        </p:nvSpPr>
-        <p:spPr/>
-        <p:txBody>
-          <a:bodyPr/>
-          <a:lstStyle/>
-          <a:p>
-            <a:r>
-              <a:rPr lang="en-IN" dirty="0" err="1" smtClean="0"/>
-              <a:t>drawr</a:t>
-            </a:r>
-            <a:r>
-              <a:rPr lang="en-IN" dirty="0" smtClean="0"/>
-              <a:t>-bootstrap</a:t>
-            </a:r>
-            <a:endParaRPr lang="en-IN" dirty="0"/>
-          </a:p>
-        </p:txBody>
-      </p:sp>
-      <p:pic>
-        <p:nvPicPr>
-          <p:cNvPr id="1027" name="Picture 3" descr="D:\Informatics\Seminar\My Workspace\Seminar_Repository\presentation\Images\First Screen.png"/>
-          <p:cNvPicPr>
-            <a:picLocks noChangeAspect="1" noChangeArrowheads="1"/>
-          </p:cNvPicPr>
-          <p:nvPr/>
-        </p:nvPicPr>
-        <p:blipFill>
-          <a:blip r:embed="rId2">
-            <a:extLst>
-              <a:ext uri="{28A0092B-C50C-407E-A947-70E740481C1C}">
-                <a14:useLocalDpi xmlns:a14="http://schemas.microsoft.com/office/drawing/2010/main" val="0"/>
-              </a:ext>
-            </a:extLst>
-          </a:blip>
-          <a:srcRect/>
-          <a:stretch>
-            <a:fillRect/>
-          </a:stretch>
-        </p:blipFill>
-        <p:spPr bwMode="auto">
-          <a:xfrm>
-            <a:off x="1371600" y="1600200"/>
-            <a:ext cx="6648450" cy="4250836"/>
-          </a:xfrm>
-          <a:prstGeom prst="rect">
-            <a:avLst/>
-          </a:prstGeom>
-          <a:noFill/>
-          <a:effectLst>
-            <a:outerShdw blurRad="63500" sx="103000" sy="103000" algn="ctr" rotWithShape="0">
-              <a:prstClr val="black">
-                <a:alpha val="40000"/>
-              </a:prstClr>
-            </a:outerShdw>
-          </a:effectLst>
-          <a:extLst>
-            <a:ext uri="{909E8E84-426E-40DD-AFC4-6F175D3DCCD1}">
-              <a14:hiddenFill xmlns:a14="http://schemas.microsoft.com/office/drawing/2010/main">
-                <a:solidFill>
-                  <a:srgbClr val="FFFFFF"/>
-                </a:solidFill>
-              </a14:hiddenFill>
-            </a:ext>
-          </a:extLst>
-        </p:spPr>
-      </p:pic>
-      <p:sp>
-        <p:nvSpPr>
-          <p:cNvPr id="4" name="TextBox 3"/>
-          <p:cNvSpPr txBox="1"/>
-          <p:nvPr/>
+          <p:cNvPr id="3" name="Content Placeholder 2"/>
+          <p:cNvSpPr>
+            <a:spLocks noGrp="1"/>
+          </p:cNvSpPr>
+          <p:nvPr>
+            <p:ph idx="1"/>
+          </p:nvPr>
         </p:nvSpPr>
         <p:spPr>
           <a:xfrm>
-            <a:off x="3835437" y="5943600"/>
-            <a:ext cx="1269963" cy="369332"/>
+            <a:off x="457200" y="1752600"/>
+            <a:ext cx="8382000" cy="4267200"/>
           </a:xfrm>
-          <a:prstGeom prst="rect">
-            <a:avLst/>
-          </a:prstGeom>
-          <a:noFill/>
         </p:spPr>
         <p:txBody>
-          <a:bodyPr wrap="none" rtlCol="0">
-            <a:spAutoFit/>
+          <a:bodyPr>
+            <a:normAutofit fontScale="92500" lnSpcReduction="10000"/>
           </a:bodyPr>
           <a:lstStyle/>
           <a:p>
             <a:r>
               <a:rPr lang="en-US" dirty="0" smtClean="0"/>
-              <a:t>First Screen</a:t>
-            </a:r>
-            <a:endParaRPr lang="en-IN" dirty="0"/>
+              <a:t>Convenient higher-level interface </a:t>
+            </a:r>
+            <a:r>
+              <a:rPr lang="en-US" dirty="0"/>
+              <a:t>to </a:t>
+            </a:r>
+            <a:r>
+              <a:rPr lang="en-US" dirty="0" smtClean="0"/>
+              <a:t>a larger body </a:t>
+            </a:r>
+            <a:r>
+              <a:rPr lang="en-US" dirty="0"/>
+              <a:t>of </a:t>
+            </a:r>
+            <a:r>
+              <a:rPr lang="en-US" dirty="0" smtClean="0"/>
+              <a:t>code</a:t>
+            </a:r>
+          </a:p>
+          <a:p>
+            <a:endParaRPr lang="en-US" dirty="0" smtClean="0"/>
+          </a:p>
+          <a:p>
+            <a:r>
+              <a:rPr lang="en-US" dirty="0" smtClean="0"/>
+              <a:t>Hides actual complexity</a:t>
+            </a:r>
+          </a:p>
+          <a:p>
+            <a:endParaRPr lang="en-US" dirty="0" smtClean="0"/>
+          </a:p>
+          <a:p>
+            <a:r>
+              <a:rPr lang="en-US" dirty="0" smtClean="0"/>
+              <a:t>Simplified presentation of API - </a:t>
+            </a:r>
+            <a:r>
+              <a:rPr lang="en-US" dirty="0"/>
+              <a:t>Improves usability</a:t>
+            </a:r>
+            <a:endParaRPr lang="en-US" dirty="0" smtClean="0"/>
+          </a:p>
+          <a:p>
+            <a:endParaRPr lang="en-US" dirty="0" smtClean="0"/>
+          </a:p>
+          <a:p>
+            <a:r>
+              <a:rPr lang="en-US" dirty="0" smtClean="0"/>
+              <a:t>Decouples class from code that utilizes it</a:t>
+            </a:r>
           </a:p>
         </p:txBody>
       </p:sp>
     </p:spTree>
     <p:extLst>
       <p:ext uri="{BB962C8B-B14F-4D97-AF65-F5344CB8AC3E}">
-        <p14:creationId xmlns:p14="http://schemas.microsoft.com/office/powerpoint/2010/main" val="462294005"/>
+        <p14:creationId xmlns:p14="http://schemas.microsoft.com/office/powerpoint/2010/main" val="2042408589"/>
       </p:ext>
     </p:extLst>
   </p:cSld>
@@ -3345,102 +5727,99 @@
           <a:lstStyle/>
           <a:p>
             <a:r>
-              <a:rPr lang="en-IN" dirty="0" err="1" smtClean="0"/>
-              <a:t>drawr</a:t>
-            </a:r>
-            <a:r>
-              <a:rPr lang="en-IN" dirty="0" smtClean="0"/>
-              <a:t>-bootstrap: features</a:t>
+              <a:rPr lang="en-US" dirty="0" smtClean="0"/>
+              <a:t>Example</a:t>
             </a:r>
             <a:endParaRPr lang="en-IN" dirty="0"/>
           </a:p>
         </p:txBody>
       </p:sp>
-      <p:sp>
-        <p:nvSpPr>
-          <p:cNvPr id="3" name="Content Placeholder 2"/>
-          <p:cNvSpPr>
-            <a:spLocks noGrp="1"/>
-          </p:cNvSpPr>
-          <p:nvPr>
-            <p:ph idx="1"/>
-          </p:nvPr>
-        </p:nvSpPr>
-        <p:spPr/>
-        <p:txBody>
-          <a:bodyPr>
-            <a:normAutofit/>
-          </a:bodyPr>
-          <a:lstStyle/>
-          <a:p>
-            <a:r>
-              <a:rPr lang="en-US" dirty="0" smtClean="0"/>
-              <a:t>Customizable drawing tool</a:t>
-            </a:r>
-          </a:p>
-          <a:p>
-            <a:r>
-              <a:rPr lang="en-US" dirty="0" smtClean="0"/>
-              <a:t>Toolbar</a:t>
-            </a:r>
-          </a:p>
-          <a:p>
-            <a:pPr lvl="1"/>
-            <a:r>
-              <a:rPr lang="en-US" dirty="0" smtClean="0"/>
-              <a:t>Brush/Eraser thickness</a:t>
-            </a:r>
-          </a:p>
-          <a:p>
-            <a:pPr lvl="1"/>
-            <a:r>
-              <a:rPr lang="en-US" dirty="0" smtClean="0"/>
-              <a:t>Color Palette</a:t>
-            </a:r>
-          </a:p>
-          <a:p>
-            <a:pPr lvl="1"/>
-            <a:r>
-              <a:rPr lang="en-US" dirty="0" smtClean="0"/>
-              <a:t>Add new color</a:t>
-            </a:r>
-          </a:p>
-          <a:p>
-            <a:pPr lvl="1"/>
-            <a:r>
-              <a:rPr lang="en-US" dirty="0" smtClean="0"/>
-              <a:t>Remove a color</a:t>
-            </a:r>
-          </a:p>
-          <a:p>
-            <a:pPr lvl="1"/>
-            <a:r>
-              <a:rPr lang="en-US" dirty="0" smtClean="0"/>
-              <a:t>Clear canvas</a:t>
-            </a:r>
-          </a:p>
-          <a:p>
-            <a:pPr lvl="1"/>
-            <a:r>
-              <a:rPr lang="en-US" dirty="0" smtClean="0"/>
-              <a:t>Save canvas</a:t>
-            </a:r>
-          </a:p>
-          <a:p>
-            <a:pPr marL="457200" lvl="1" indent="0">
-              <a:buNone/>
-            </a:pPr>
-            <a:endParaRPr lang="en-US" dirty="0" smtClean="0"/>
-          </a:p>
-          <a:p>
-            <a:endParaRPr lang="en-IN" dirty="0"/>
-          </a:p>
-        </p:txBody>
-      </p:sp>
+      <p:pic>
+        <p:nvPicPr>
+          <p:cNvPr id="1026" name="Picture 2" descr="D:\Informatics\Seminar\My Workspace\Seminar_Repository\presentation\Images\desktop shortcut.png"/>
+          <p:cNvPicPr>
+            <a:picLocks noChangeAspect="1" noChangeArrowheads="1"/>
+          </p:cNvPicPr>
+          <p:nvPr/>
+        </p:nvPicPr>
+        <p:blipFill>
+          <a:blip r:embed="rId2">
+            <a:extLst>
+              <a:ext uri="{28A0092B-C50C-407E-A947-70E740481C1C}">
+                <a14:useLocalDpi xmlns:a14="http://schemas.microsoft.com/office/drawing/2010/main" val="0"/>
+              </a:ext>
+            </a:extLst>
+          </a:blip>
+          <a:srcRect/>
+          <a:stretch>
+            <a:fillRect/>
+          </a:stretch>
+        </p:blipFill>
+        <p:spPr bwMode="auto">
+          <a:xfrm>
+            <a:off x="685800" y="1752600"/>
+            <a:ext cx="981075" cy="2552700"/>
+          </a:xfrm>
+          <a:prstGeom prst="rect">
+            <a:avLst/>
+          </a:prstGeom>
+          <a:noFill/>
+          <a:extLst>
+            <a:ext uri="{909E8E84-426E-40DD-AFC4-6F175D3DCCD1}">
+              <a14:hiddenFill xmlns:a14="http://schemas.microsoft.com/office/drawing/2010/main">
+                <a:solidFill>
+                  <a:srgbClr val="FFFFFF"/>
+                </a:solidFill>
+              </a14:hiddenFill>
+            </a:ext>
+          </a:extLst>
+        </p:spPr>
+      </p:pic>
+      <p:pic>
+        <p:nvPicPr>
+          <p:cNvPr id="1027" name="Picture 3" descr="D:\Informatics\Seminar\My Workspace\Seminar_Repository\presentation\Images\absolute path.png"/>
+          <p:cNvPicPr>
+            <a:picLocks noChangeAspect="1" noChangeArrowheads="1"/>
+          </p:cNvPicPr>
+          <p:nvPr/>
+        </p:nvPicPr>
+        <p:blipFill>
+          <a:blip r:embed="rId3">
+            <a:extLst>
+              <a:ext uri="{28A0092B-C50C-407E-A947-70E740481C1C}">
+                <a14:useLocalDpi xmlns:a14="http://schemas.microsoft.com/office/drawing/2010/main" val="0"/>
+              </a:ext>
+            </a:extLst>
+          </a:blip>
+          <a:srcRect/>
+          <a:stretch>
+            <a:fillRect/>
+          </a:stretch>
+        </p:blipFill>
+        <p:spPr bwMode="auto">
+          <a:xfrm>
+            <a:off x="2028825" y="3867150"/>
+            <a:ext cx="6505575" cy="2152650"/>
+          </a:xfrm>
+          <a:prstGeom prst="rect">
+            <a:avLst/>
+          </a:prstGeom>
+          <a:noFill/>
+          <a:extLst>
+            <a:ext uri="{909E8E84-426E-40DD-AFC4-6F175D3DCCD1}">
+              <a14:hiddenFill xmlns:a14="http://schemas.microsoft.com/office/drawing/2010/main">
+                <a:solidFill>
+                  <a:srgbClr val="FFFFFF"/>
+                </a:solidFill>
+              </a14:hiddenFill>
+            </a:ext>
+          </a:extLst>
+        </p:spPr>
+      </p:pic>
     </p:spTree>
     <p:extLst>
       <p:ext uri="{BB962C8B-B14F-4D97-AF65-F5344CB8AC3E}">
-        <p14:creationId xmlns:p14="http://schemas.microsoft.com/office/powerpoint/2010/main" val="2491645263"/>
+        <p14:creationId xmlns:p14="http://schemas.microsoft.com/office/powerpoint/2010/main" val="362052835"/>
       </p:ext>
     </p:extLst>
   </p:cSld>
@@ -3491,7 +5870,11 @@
           <a:p>
             <a:r>
               <a:rPr lang="en-US" dirty="0" smtClean="0"/>
-              <a:t>Several event listeners &amp; handlers</a:t>
+              <a:t>Example - </a:t>
+            </a:r>
+            <a:r>
+              <a:rPr lang="en-US" dirty="0" err="1" smtClean="0"/>
+              <a:t>jQuery</a:t>
             </a:r>
             <a:endParaRPr lang="en-IN" dirty="0"/>
           </a:p>
@@ -3510,428 +5893,24 @@
         <p:spPr/>
         <p:txBody>
           <a:bodyPr>
-            <a:normAutofit fontScale="70000" lnSpcReduction="20000"/>
+            <a:normAutofit/>
           </a:bodyPr>
           <a:lstStyle/>
           <a:p>
-            <a:r>
-              <a:rPr lang="en-IN" dirty="0" smtClean="0"/>
-              <a:t>$(</a:t>
-            </a:r>
-            <a:r>
-              <a:rPr lang="en-IN" b="1" dirty="0" smtClean="0"/>
-              <a:t>'#palette'</a:t>
-            </a:r>
-            <a:r>
-              <a:rPr lang="en-IN" dirty="0" smtClean="0"/>
-              <a:t>).on(</a:t>
-            </a:r>
-            <a:r>
-              <a:rPr lang="en-IN" b="1" dirty="0" smtClean="0"/>
-              <a:t>'click'</a:t>
-            </a:r>
-            <a:r>
-              <a:rPr lang="en-IN" dirty="0" smtClean="0"/>
-              <a:t>, </a:t>
-            </a:r>
-            <a:r>
-              <a:rPr lang="en-IN" b="1" dirty="0" smtClean="0"/>
-              <a:t>'li'</a:t>
-            </a:r>
-            <a:r>
-              <a:rPr lang="en-IN" dirty="0" smtClean="0"/>
-              <a:t>, </a:t>
-            </a:r>
-            <a:r>
-              <a:rPr lang="en-IN" b="1" dirty="0" smtClean="0"/>
-              <a:t>function </a:t>
-            </a:r>
-            <a:r>
-              <a:rPr lang="en-IN" dirty="0" smtClean="0"/>
-              <a:t>() {…}</a:t>
-            </a:r>
-            <a:endParaRPr lang="en-US" i="1" dirty="0" smtClean="0"/>
-          </a:p>
-          <a:p>
+            <a:pPr marL="0" indent="0" fontAlgn="base">
+              <a:buNone/>
+            </a:pPr>
             <a:r>
               <a:rPr lang="en-US" dirty="0" smtClean="0"/>
-              <a:t>$(</a:t>
-            </a:r>
-            <a:r>
-              <a:rPr lang="en-US" b="1" dirty="0" smtClean="0"/>
-              <a:t>'#</a:t>
-            </a:r>
-            <a:r>
-              <a:rPr lang="en-US" b="1" dirty="0"/>
-              <a:t>erase'</a:t>
+              <a:t>Group </a:t>
+            </a:r>
+            <a:r>
+              <a:rPr lang="en-US" dirty="0"/>
+              <a:t>of </a:t>
             </a:r>
             <a:r>
               <a:rPr lang="en-US" dirty="0" smtClean="0"/>
-              <a:t>).</a:t>
-            </a:r>
-            <a:r>
-              <a:rPr lang="en-US" dirty="0"/>
-              <a:t>click</a:t>
-            </a:r>
-            <a:r>
-              <a:rPr lang="en-US" dirty="0" smtClean="0"/>
-              <a:t>(</a:t>
-            </a:r>
-            <a:r>
-              <a:rPr lang="en-US" b="1" dirty="0"/>
-              <a:t>function </a:t>
-            </a:r>
-            <a:r>
-              <a:rPr lang="en-US" dirty="0" smtClean="0"/>
-              <a:t>() { </a:t>
-            </a:r>
-            <a:r>
-              <a:rPr lang="en-US" i="1" dirty="0" smtClean="0"/>
-              <a:t>…</a:t>
-            </a:r>
-            <a:r>
-              <a:rPr lang="en-US" dirty="0" smtClean="0"/>
-              <a:t>}</a:t>
-            </a:r>
-          </a:p>
-          <a:p>
-            <a:r>
-              <a:rPr lang="en-IN" dirty="0" smtClean="0"/>
-              <a:t>$(</a:t>
-            </a:r>
-            <a:r>
-              <a:rPr lang="en-IN" b="1" dirty="0"/>
-              <a:t>'#thickness'</a:t>
-            </a:r>
-            <a:r>
-              <a:rPr lang="en-IN" dirty="0" smtClean="0"/>
-              <a:t>).change(</a:t>
-            </a:r>
-            <a:r>
-              <a:rPr lang="en-IN" b="1" dirty="0"/>
-              <a:t>function </a:t>
-            </a:r>
-            <a:r>
-              <a:rPr lang="en-IN" dirty="0" smtClean="0"/>
-              <a:t>() {…}</a:t>
-            </a:r>
-          </a:p>
-          <a:p>
-            <a:r>
-              <a:rPr lang="en-IN" dirty="0" smtClean="0"/>
-              <a:t>$(</a:t>
-            </a:r>
-            <a:r>
-              <a:rPr lang="en-IN" b="1" dirty="0"/>
-              <a:t>'#</a:t>
-            </a:r>
-            <a:r>
-              <a:rPr lang="en-IN" b="1" dirty="0" err="1"/>
-              <a:t>eraserthickness</a:t>
-            </a:r>
-            <a:r>
-              <a:rPr lang="en-IN" b="1" dirty="0"/>
-              <a:t>'</a:t>
-            </a:r>
-            <a:r>
-              <a:rPr lang="en-IN" dirty="0" smtClean="0"/>
-              <a:t>).change(</a:t>
-            </a:r>
-            <a:r>
-              <a:rPr lang="en-IN" b="1" dirty="0"/>
-              <a:t>function </a:t>
-            </a:r>
-            <a:r>
-              <a:rPr lang="en-IN" dirty="0" smtClean="0"/>
-              <a:t>() {…}</a:t>
-            </a:r>
-          </a:p>
-          <a:p>
-            <a:r>
-              <a:rPr lang="en-IN" dirty="0" smtClean="0"/>
-              <a:t>$(</a:t>
-            </a:r>
-            <a:r>
-              <a:rPr lang="en-IN" b="1" dirty="0"/>
-              <a:t>'#save'</a:t>
-            </a:r>
-            <a:r>
-              <a:rPr lang="en-IN" dirty="0" smtClean="0"/>
-              <a:t>).</a:t>
-            </a:r>
-            <a:r>
-              <a:rPr lang="en-IN" dirty="0"/>
-              <a:t>click</a:t>
-            </a:r>
-            <a:r>
-              <a:rPr lang="en-IN" dirty="0" smtClean="0"/>
-              <a:t>(</a:t>
-            </a:r>
-            <a:r>
-              <a:rPr lang="en-IN" b="1" dirty="0"/>
-              <a:t>function </a:t>
-            </a:r>
-            <a:r>
-              <a:rPr lang="en-IN" dirty="0" smtClean="0"/>
-              <a:t>() {…}</a:t>
-            </a:r>
-          </a:p>
-          <a:p>
-            <a:r>
-              <a:rPr lang="en-IN" dirty="0" smtClean="0"/>
-              <a:t>$(</a:t>
-            </a:r>
-            <a:r>
-              <a:rPr lang="en-IN" b="1" dirty="0"/>
-              <a:t>'#clear'</a:t>
-            </a:r>
-            <a:r>
-              <a:rPr lang="en-IN" dirty="0" smtClean="0"/>
-              <a:t>).</a:t>
-            </a:r>
-            <a:r>
-              <a:rPr lang="en-IN" dirty="0"/>
-              <a:t>click</a:t>
-            </a:r>
-            <a:r>
-              <a:rPr lang="en-IN" dirty="0" smtClean="0"/>
-              <a:t>(</a:t>
-            </a:r>
-            <a:r>
-              <a:rPr lang="en-IN" b="1" dirty="0"/>
-              <a:t>function </a:t>
-            </a:r>
-            <a:r>
-              <a:rPr lang="en-IN" dirty="0" smtClean="0"/>
-              <a:t>() {…}</a:t>
-            </a:r>
-          </a:p>
-          <a:p>
-            <a:r>
-              <a:rPr lang="en-IN" dirty="0" smtClean="0"/>
-              <a:t>$(</a:t>
-            </a:r>
-            <a:r>
-              <a:rPr lang="en-IN" b="1" dirty="0"/>
-              <a:t>'#</a:t>
-            </a:r>
-            <a:r>
-              <a:rPr lang="en-IN" b="1" dirty="0" err="1"/>
-              <a:t>addcolor</a:t>
-            </a:r>
-            <a:r>
-              <a:rPr lang="en-IN" b="1" dirty="0"/>
-              <a:t>'</a:t>
-            </a:r>
-            <a:r>
-              <a:rPr lang="en-IN" dirty="0" smtClean="0"/>
-              <a:t>).</a:t>
-            </a:r>
-            <a:r>
-              <a:rPr lang="en-IN" dirty="0"/>
-              <a:t>click</a:t>
-            </a:r>
-            <a:r>
-              <a:rPr lang="en-IN" dirty="0" smtClean="0"/>
-              <a:t>(</a:t>
-            </a:r>
-            <a:r>
-              <a:rPr lang="en-IN" b="1" dirty="0"/>
-              <a:t>function </a:t>
-            </a:r>
-            <a:r>
-              <a:rPr lang="en-IN" dirty="0" smtClean="0"/>
-              <a:t>() {…}</a:t>
-            </a:r>
-          </a:p>
-          <a:p>
-            <a:r>
-              <a:rPr lang="en-IN" dirty="0" smtClean="0"/>
-              <a:t>$(</a:t>
-            </a:r>
-            <a:r>
-              <a:rPr lang="en-IN" b="1" dirty="0"/>
-              <a:t>'#</a:t>
-            </a:r>
-            <a:r>
-              <a:rPr lang="en-IN" b="1" dirty="0" err="1"/>
-              <a:t>removecolor</a:t>
-            </a:r>
-            <a:r>
-              <a:rPr lang="en-IN" b="1" dirty="0"/>
-              <a:t>'</a:t>
-            </a:r>
-            <a:r>
-              <a:rPr lang="en-IN" dirty="0" smtClean="0"/>
-              <a:t>).</a:t>
-            </a:r>
-            <a:r>
-              <a:rPr lang="en-IN" dirty="0"/>
-              <a:t>click</a:t>
-            </a:r>
-            <a:r>
-              <a:rPr lang="en-IN" dirty="0" smtClean="0"/>
-              <a:t>(</a:t>
-            </a:r>
-            <a:r>
-              <a:rPr lang="en-IN" b="1" dirty="0"/>
-              <a:t>function </a:t>
-            </a:r>
-            <a:r>
-              <a:rPr lang="en-IN" dirty="0" smtClean="0"/>
-              <a:t>() {…}</a:t>
-            </a:r>
-          </a:p>
-          <a:p>
-            <a:r>
-              <a:rPr lang="en-IN" dirty="0" smtClean="0"/>
-              <a:t>$(</a:t>
-            </a:r>
-            <a:r>
-              <a:rPr lang="en-IN" b="1" dirty="0"/>
-              <a:t>'#</a:t>
-            </a:r>
-            <a:r>
-              <a:rPr lang="en-IN" b="1" dirty="0" err="1"/>
-              <a:t>attachcolor</a:t>
-            </a:r>
-            <a:r>
-              <a:rPr lang="en-IN" b="1" dirty="0"/>
-              <a:t>'</a:t>
-            </a:r>
-            <a:r>
-              <a:rPr lang="en-IN" dirty="0" smtClean="0"/>
-              <a:t>).</a:t>
-            </a:r>
-            <a:r>
-              <a:rPr lang="en-IN" dirty="0"/>
-              <a:t>click</a:t>
-            </a:r>
-            <a:r>
-              <a:rPr lang="en-IN" dirty="0" smtClean="0"/>
-              <a:t>(</a:t>
-            </a:r>
-            <a:r>
-              <a:rPr lang="en-IN" b="1" dirty="0"/>
-              <a:t>function </a:t>
-            </a:r>
-            <a:r>
-              <a:rPr lang="en-IN" dirty="0" smtClean="0"/>
-              <a:t>() {…}</a:t>
-            </a:r>
-          </a:p>
-          <a:p>
-            <a:r>
-              <a:rPr lang="en-IN" dirty="0" smtClean="0"/>
-              <a:t>$(</a:t>
-            </a:r>
-            <a:r>
-              <a:rPr lang="en-IN" b="1" dirty="0"/>
-              <a:t>'#</a:t>
-            </a:r>
-            <a:r>
-              <a:rPr lang="en-IN" b="1" dirty="0" err="1"/>
-              <a:t>cancelcolor</a:t>
-            </a:r>
-            <a:r>
-              <a:rPr lang="en-IN" b="1" dirty="0"/>
-              <a:t>'</a:t>
-            </a:r>
-            <a:r>
-              <a:rPr lang="en-IN" dirty="0" smtClean="0"/>
-              <a:t>).</a:t>
-            </a:r>
-            <a:r>
-              <a:rPr lang="en-IN" dirty="0"/>
-              <a:t>click</a:t>
-            </a:r>
-            <a:r>
-              <a:rPr lang="en-IN" dirty="0" smtClean="0"/>
-              <a:t>(</a:t>
-            </a:r>
-            <a:r>
-              <a:rPr lang="en-IN" b="1" dirty="0"/>
-              <a:t>function </a:t>
-            </a:r>
-            <a:r>
-              <a:rPr lang="en-IN" dirty="0" smtClean="0"/>
-              <a:t>() {…}</a:t>
-            </a:r>
-          </a:p>
-          <a:p>
-            <a:r>
-              <a:rPr lang="en-IN" dirty="0" smtClean="0"/>
-              <a:t>$(</a:t>
-            </a:r>
-            <a:r>
-              <a:rPr lang="en-IN" b="1" dirty="0"/>
-              <a:t>'.</a:t>
-            </a:r>
-            <a:r>
-              <a:rPr lang="en-IN" b="1" dirty="0" err="1"/>
-              <a:t>colorslider</a:t>
-            </a:r>
-            <a:r>
-              <a:rPr lang="en-IN" b="1" dirty="0"/>
-              <a:t>'</a:t>
-            </a:r>
-            <a:r>
-              <a:rPr lang="en-IN" dirty="0" smtClean="0"/>
-              <a:t>).change(</a:t>
-            </a:r>
-            <a:r>
-              <a:rPr lang="en-IN" b="1" dirty="0"/>
-              <a:t>function </a:t>
-            </a:r>
-            <a:r>
-              <a:rPr lang="en-IN" dirty="0" smtClean="0"/>
-              <a:t>() {…}</a:t>
-            </a:r>
-          </a:p>
-          <a:p>
-            <a:r>
-              <a:rPr lang="en-IN" dirty="0" err="1"/>
-              <a:t>paintSurface</a:t>
-            </a:r>
-            <a:r>
-              <a:rPr lang="en-IN" dirty="0" err="1" smtClean="0"/>
-              <a:t>.mousedown</a:t>
-            </a:r>
-            <a:r>
-              <a:rPr lang="en-IN" dirty="0" smtClean="0"/>
-              <a:t>(</a:t>
-            </a:r>
-            <a:r>
-              <a:rPr lang="en-IN" b="1" dirty="0"/>
-              <a:t>function </a:t>
-            </a:r>
-            <a:r>
-              <a:rPr lang="en-IN" dirty="0" smtClean="0"/>
-              <a:t>(e) {…}</a:t>
-            </a:r>
-          </a:p>
-          <a:p>
-            <a:r>
-              <a:rPr lang="en-IN" dirty="0" err="1" smtClean="0">
-                <a:effectLst/>
-              </a:rPr>
-              <a:t>paintSurface</a:t>
-            </a:r>
-            <a:r>
-              <a:rPr lang="en-IN" dirty="0" err="1" smtClean="0"/>
-              <a:t>.mousemove</a:t>
-            </a:r>
-            <a:r>
-              <a:rPr lang="en-IN" dirty="0" smtClean="0"/>
-              <a:t>(</a:t>
-            </a:r>
-            <a:r>
-              <a:rPr lang="en-IN" b="1" dirty="0"/>
-              <a:t>function </a:t>
-            </a:r>
-            <a:r>
-              <a:rPr lang="en-IN" dirty="0" smtClean="0"/>
-              <a:t>(e) {…}</a:t>
+              <a:t>facades – makes programming easier and faster</a:t>
             </a:r>
           </a:p>
         </p:txBody>
@@ -3939,7 +5918,7 @@
     </p:spTree>
     <p:extLst>
       <p:ext uri="{BB962C8B-B14F-4D97-AF65-F5344CB8AC3E}">
-        <p14:creationId xmlns:p14="http://schemas.microsoft.com/office/powerpoint/2010/main" val="3653693353"/>
+        <p14:creationId xmlns:p14="http://schemas.microsoft.com/office/powerpoint/2010/main" val="2476965302"/>
       </p:ext>
     </p:extLst>
   </p:cSld>
@@ -3990,7 +5969,11 @@
           <a:p>
             <a:r>
               <a:rPr lang="en-US" dirty="0" smtClean="0"/>
-              <a:t>Event listeners - Challenges</a:t>
+              <a:t>Example - </a:t>
+            </a:r>
+            <a:r>
+              <a:rPr lang="en-US" dirty="0" err="1" smtClean="0"/>
+              <a:t>jQuery</a:t>
             </a:r>
             <a:endParaRPr lang="en-IN" dirty="0"/>
           </a:p>
@@ -4008,17 +5991,994 @@
         </p:nvSpPr>
         <p:spPr/>
         <p:txBody>
-          <a:bodyPr/>
-          <a:lstStyle/>
-          <a:p>
-            <a:endParaRPr lang="en-IN" dirty="0"/>
+          <a:bodyPr>
+            <a:normAutofit/>
+          </a:bodyPr>
+          <a:lstStyle/>
+          <a:p>
+            <a:pPr marL="0" indent="0" fontAlgn="base">
+              <a:buNone/>
+            </a:pPr>
+            <a:r>
+              <a:rPr lang="en-US" dirty="0" smtClean="0"/>
+              <a:t>Group </a:t>
+            </a:r>
+            <a:r>
+              <a:rPr lang="en-US" dirty="0"/>
+              <a:t>of </a:t>
+            </a:r>
+            <a:r>
+              <a:rPr lang="en-US" dirty="0" smtClean="0"/>
+              <a:t>facades – </a:t>
+            </a:r>
+            <a:r>
+              <a:rPr lang="en-US" dirty="0"/>
+              <a:t>makes programming easier and </a:t>
+            </a:r>
+            <a:r>
+              <a:rPr lang="en-US" dirty="0" smtClean="0"/>
+              <a:t>faster</a:t>
+            </a:r>
+            <a:endParaRPr lang="en-US" dirty="0"/>
+          </a:p>
+          <a:p>
+            <a:pPr marL="0" indent="0" fontAlgn="base">
+              <a:buNone/>
+            </a:pPr>
+            <a:endParaRPr lang="en-IN" dirty="0" smtClean="0"/>
+          </a:p>
+          <a:p>
+            <a:pPr marL="0" indent="0" fontAlgn="base">
+              <a:buNone/>
+            </a:pPr>
+            <a:r>
+              <a:rPr lang="en-IN" dirty="0" smtClean="0"/>
+              <a:t>facades </a:t>
+            </a:r>
+            <a:r>
+              <a:rPr lang="en-IN" dirty="0"/>
+              <a:t>for $.</a:t>
+            </a:r>
+            <a:r>
+              <a:rPr lang="en-IN" dirty="0" err="1"/>
+              <a:t>ajax</a:t>
+            </a:r>
+            <a:r>
+              <a:rPr lang="en-IN" dirty="0" smtClean="0"/>
+              <a:t>()</a:t>
+            </a:r>
+            <a:endParaRPr lang="en-IN" sz="2800" dirty="0" smtClean="0"/>
+          </a:p>
+          <a:p>
+            <a:pPr fontAlgn="base"/>
+            <a:endParaRPr lang="en-IN" sz="2800" dirty="0"/>
+          </a:p>
+          <a:p>
+            <a:pPr fontAlgn="base"/>
+            <a:r>
+              <a:rPr lang="en-IN" sz="2800" dirty="0" smtClean="0"/>
+              <a:t>$.</a:t>
+            </a:r>
+            <a:r>
+              <a:rPr lang="en-IN" sz="2800" dirty="0"/>
+              <a:t>get( </a:t>
+            </a:r>
+            <a:r>
+              <a:rPr lang="en-IN" sz="2800" dirty="0" err="1"/>
+              <a:t>url</a:t>
+            </a:r>
+            <a:r>
+              <a:rPr lang="en-IN" sz="2800" dirty="0"/>
+              <a:t>, data, </a:t>
+            </a:r>
+            <a:r>
+              <a:rPr lang="en-IN" sz="2800" dirty="0" err="1"/>
+              <a:t>callback</a:t>
+            </a:r>
+            <a:r>
+              <a:rPr lang="en-IN" sz="2800" dirty="0"/>
+              <a:t>, </a:t>
+            </a:r>
+            <a:r>
+              <a:rPr lang="en-IN" sz="2800" dirty="0" err="1"/>
+              <a:t>dataType</a:t>
+            </a:r>
+            <a:r>
+              <a:rPr lang="en-IN" sz="2800" dirty="0"/>
+              <a:t> );</a:t>
+            </a:r>
+          </a:p>
+          <a:p>
+            <a:pPr fontAlgn="base"/>
+            <a:r>
+              <a:rPr lang="en-IN" sz="2800" dirty="0"/>
+              <a:t>$.post( </a:t>
+            </a:r>
+            <a:r>
+              <a:rPr lang="en-IN" sz="2800" dirty="0" err="1"/>
+              <a:t>url</a:t>
+            </a:r>
+            <a:r>
+              <a:rPr lang="en-IN" sz="2800" dirty="0"/>
+              <a:t>, data, </a:t>
+            </a:r>
+            <a:r>
+              <a:rPr lang="en-IN" sz="2800" dirty="0" err="1"/>
+              <a:t>callback</a:t>
+            </a:r>
+            <a:r>
+              <a:rPr lang="en-IN" sz="2800" dirty="0"/>
+              <a:t>, </a:t>
+            </a:r>
+            <a:r>
+              <a:rPr lang="en-IN" sz="2800" dirty="0" err="1"/>
+              <a:t>dataType</a:t>
+            </a:r>
+            <a:r>
+              <a:rPr lang="en-IN" sz="2800" dirty="0"/>
+              <a:t> );</a:t>
+            </a:r>
+          </a:p>
+          <a:p>
+            <a:pPr fontAlgn="base"/>
+            <a:r>
+              <a:rPr lang="en-IN" sz="2800" dirty="0"/>
+              <a:t>$.</a:t>
+            </a:r>
+            <a:r>
+              <a:rPr lang="en-IN" sz="2800" dirty="0" err="1"/>
+              <a:t>getJSON</a:t>
+            </a:r>
+            <a:r>
+              <a:rPr lang="en-IN" sz="2800" dirty="0"/>
+              <a:t>( </a:t>
+            </a:r>
+            <a:r>
+              <a:rPr lang="en-IN" sz="2800" dirty="0" err="1"/>
+              <a:t>url</a:t>
+            </a:r>
+            <a:r>
+              <a:rPr lang="en-IN" sz="2800" dirty="0"/>
+              <a:t>, data, </a:t>
+            </a:r>
+            <a:r>
+              <a:rPr lang="en-IN" sz="2800" dirty="0" err="1"/>
+              <a:t>callback</a:t>
+            </a:r>
+            <a:r>
+              <a:rPr lang="en-IN" sz="2800" dirty="0"/>
+              <a:t> </a:t>
+            </a:r>
+            <a:r>
+              <a:rPr lang="en-IN" sz="2800" dirty="0" smtClean="0"/>
+              <a:t>);</a:t>
+            </a:r>
+            <a:endParaRPr lang="en-IN" sz="2800" dirty="0"/>
           </a:p>
         </p:txBody>
       </p:sp>
     </p:spTree>
     <p:extLst>
       <p:ext uri="{BB962C8B-B14F-4D97-AF65-F5344CB8AC3E}">
-        <p14:creationId xmlns:p14="http://schemas.microsoft.com/office/powerpoint/2010/main" val="1165194372"/>
+        <p14:creationId xmlns:p14="http://schemas.microsoft.com/office/powerpoint/2010/main" val="1683086345"/>
+      </p:ext>
+    </p:extLst>
+  </p:cSld>
+  <p:clrMapOvr>
+    <a:masterClrMapping/>
+  </p:clrMapOvr>
+  <p:timing>
+    <p:tnLst>
+      <p:par>
+        <p:cTn id="1" dur="indefinite" restart="never" nodeType="tmRoot"/>
+      </p:par>
+    </p:tnLst>
+  </p:timing>
+</p:sld>
+</file>
+
+<file path=ppt/slides/slide6.xml><?xml version="1.0" encoding="utf-8"?>
+<p:sld xmlns:a="http://schemas.openxmlformats.org/drawingml/2006/main" xmlns:r="http://schemas.openxmlformats.org/officeDocument/2006/relationships" xmlns:p="http://schemas.openxmlformats.org/presentationml/2006/main">
+  <p:cSld>
+    <p:spTree>
+      <p:nvGrpSpPr>
+        <p:cNvPr id="1" name=""/>
+        <p:cNvGrpSpPr/>
+        <p:nvPr/>
+      </p:nvGrpSpPr>
+      <p:grpSpPr>
+        <a:xfrm>
+          <a:off x="0" y="0"/>
+          <a:ext cx="0" cy="0"/>
+          <a:chOff x="0" y="0"/>
+          <a:chExt cx="0" cy="0"/>
+        </a:xfrm>
+      </p:grpSpPr>
+      <p:pic>
+        <p:nvPicPr>
+          <p:cNvPr id="9222" name="Picture 6" descr="D:\Informatics\Seminar\My Workspace\Seminar_Repository\presentation\Images\ajax facades.png"/>
+          <p:cNvPicPr>
+            <a:picLocks noChangeAspect="1" noChangeArrowheads="1"/>
+          </p:cNvPicPr>
+          <p:nvPr/>
+        </p:nvPicPr>
+        <p:blipFill>
+          <a:blip r:embed="rId2">
+            <a:extLst>
+              <a:ext uri="{28A0092B-C50C-407E-A947-70E740481C1C}">
+                <a14:useLocalDpi xmlns:a14="http://schemas.microsoft.com/office/drawing/2010/main" val="0"/>
+              </a:ext>
+            </a:extLst>
+          </a:blip>
+          <a:srcRect/>
+          <a:stretch>
+            <a:fillRect/>
+          </a:stretch>
+        </p:blipFill>
+        <p:spPr bwMode="auto">
+          <a:xfrm>
+            <a:off x="2447925" y="3371850"/>
+            <a:ext cx="4105275" cy="819150"/>
+          </a:xfrm>
+          <a:prstGeom prst="rect">
+            <a:avLst/>
+          </a:prstGeom>
+          <a:noFill/>
+          <a:extLst>
+            <a:ext uri="{909E8E84-426E-40DD-AFC4-6F175D3DCCD1}">
+              <a14:hiddenFill xmlns:a14="http://schemas.microsoft.com/office/drawing/2010/main">
+                <a:solidFill>
+                  <a:srgbClr val="FFFFFF"/>
+                </a:solidFill>
+              </a14:hiddenFill>
+            </a:ext>
+          </a:extLst>
+        </p:spPr>
+      </p:pic>
+      <p:sp>
+        <p:nvSpPr>
+          <p:cNvPr id="2" name="Title 1"/>
+          <p:cNvSpPr>
+            <a:spLocks noGrp="1"/>
+          </p:cNvSpPr>
+          <p:nvPr>
+            <p:ph type="title"/>
+          </p:nvPr>
+        </p:nvSpPr>
+        <p:spPr/>
+        <p:txBody>
+          <a:bodyPr/>
+          <a:lstStyle/>
+          <a:p>
+            <a:r>
+              <a:rPr lang="en-US" dirty="0" smtClean="0"/>
+              <a:t>Behind the scenes</a:t>
+            </a:r>
+            <a:endParaRPr lang="en-IN" dirty="0"/>
+          </a:p>
+        </p:txBody>
+      </p:sp>
+      <p:pic>
+        <p:nvPicPr>
+          <p:cNvPr id="9219" name="Picture 3" descr="D:\Informatics\Seminar\My Workspace\Seminar_Repository\presentation\Images\ajax get().png"/>
+          <p:cNvPicPr>
+            <a:picLocks noChangeAspect="1" noChangeArrowheads="1"/>
+          </p:cNvPicPr>
+          <p:nvPr/>
+        </p:nvPicPr>
+        <p:blipFill>
+          <a:blip r:embed="rId3">
+            <a:extLst>
+              <a:ext uri="{28A0092B-C50C-407E-A947-70E740481C1C}">
+                <a14:useLocalDpi xmlns:a14="http://schemas.microsoft.com/office/drawing/2010/main" val="0"/>
+              </a:ext>
+            </a:extLst>
+          </a:blip>
+          <a:srcRect/>
+          <a:stretch>
+            <a:fillRect/>
+          </a:stretch>
+        </p:blipFill>
+        <p:spPr bwMode="auto">
+          <a:xfrm>
+            <a:off x="6019800" y="1676400"/>
+            <a:ext cx="2409825" cy="1257300"/>
+          </a:xfrm>
+          <a:prstGeom prst="rect">
+            <a:avLst/>
+          </a:prstGeom>
+          <a:noFill/>
+          <a:extLst>
+            <a:ext uri="{909E8E84-426E-40DD-AFC4-6F175D3DCCD1}">
+              <a14:hiddenFill xmlns:a14="http://schemas.microsoft.com/office/drawing/2010/main">
+                <a:solidFill>
+                  <a:srgbClr val="FFFFFF"/>
+                </a:solidFill>
+              </a14:hiddenFill>
+            </a:ext>
+          </a:extLst>
+        </p:spPr>
+      </p:pic>
+      <p:pic>
+        <p:nvPicPr>
+          <p:cNvPr id="9220" name="Picture 4" descr="D:\Informatics\Seminar\My Workspace\Seminar_Repository\presentation\Images\ajax getjson().png"/>
+          <p:cNvPicPr>
+            <a:picLocks noChangeAspect="1" noChangeArrowheads="1"/>
+          </p:cNvPicPr>
+          <p:nvPr/>
+        </p:nvPicPr>
+        <p:blipFill>
+          <a:blip r:embed="rId4">
+            <a:extLst>
+              <a:ext uri="{28A0092B-C50C-407E-A947-70E740481C1C}">
+                <a14:useLocalDpi xmlns:a14="http://schemas.microsoft.com/office/drawing/2010/main" val="0"/>
+              </a:ext>
+            </a:extLst>
+          </a:blip>
+          <a:srcRect/>
+          <a:stretch>
+            <a:fillRect/>
+          </a:stretch>
+        </p:blipFill>
+        <p:spPr bwMode="auto">
+          <a:xfrm>
+            <a:off x="3667125" y="5143500"/>
+            <a:ext cx="2428875" cy="1181100"/>
+          </a:xfrm>
+          <a:prstGeom prst="rect">
+            <a:avLst/>
+          </a:prstGeom>
+          <a:noFill/>
+          <a:extLst>
+            <a:ext uri="{909E8E84-426E-40DD-AFC4-6F175D3DCCD1}">
+              <a14:hiddenFill xmlns:a14="http://schemas.microsoft.com/office/drawing/2010/main">
+                <a:solidFill>
+                  <a:srgbClr val="FFFFFF"/>
+                </a:solidFill>
+              </a14:hiddenFill>
+            </a:ext>
+          </a:extLst>
+        </p:spPr>
+      </p:pic>
+      <p:pic>
+        <p:nvPicPr>
+          <p:cNvPr id="9221" name="Picture 5" descr="D:\Informatics\Seminar\My Workspace\Seminar_Repository\presentation\Images\ajax post().png"/>
+          <p:cNvPicPr>
+            <a:picLocks noChangeAspect="1" noChangeArrowheads="1"/>
+          </p:cNvPicPr>
+          <p:nvPr/>
+        </p:nvPicPr>
+        <p:blipFill>
+          <a:blip r:embed="rId5">
+            <a:extLst>
+              <a:ext uri="{28A0092B-C50C-407E-A947-70E740481C1C}">
+                <a14:useLocalDpi xmlns:a14="http://schemas.microsoft.com/office/drawing/2010/main" val="0"/>
+              </a:ext>
+            </a:extLst>
+          </a:blip>
+          <a:srcRect/>
+          <a:stretch>
+            <a:fillRect/>
+          </a:stretch>
+        </p:blipFill>
+        <p:spPr bwMode="auto">
+          <a:xfrm>
+            <a:off x="415925" y="1549400"/>
+            <a:ext cx="2466975" cy="1390650"/>
+          </a:xfrm>
+          <a:prstGeom prst="rect">
+            <a:avLst/>
+          </a:prstGeom>
+          <a:noFill/>
+          <a:extLst>
+            <a:ext uri="{909E8E84-426E-40DD-AFC4-6F175D3DCCD1}">
+              <a14:hiddenFill xmlns:a14="http://schemas.microsoft.com/office/drawing/2010/main">
+                <a:solidFill>
+                  <a:srgbClr val="FFFFFF"/>
+                </a:solidFill>
+              </a14:hiddenFill>
+            </a:ext>
+          </a:extLst>
+        </p:spPr>
+      </p:pic>
+      <p:cxnSp>
+        <p:nvCxnSpPr>
+          <p:cNvPr id="5" name="Elbow Connector 4"/>
+          <p:cNvCxnSpPr>
+            <a:endCxn id="9221" idx="2"/>
+          </p:cNvCxnSpPr>
+          <p:nvPr/>
+        </p:nvCxnSpPr>
+        <p:spPr>
+          <a:xfrm rot="10800000">
+            <a:off x="1649414" y="2940051"/>
+            <a:ext cx="941387" cy="793751"/>
+          </a:xfrm>
+          <a:prstGeom prst="bentConnector2">
+            <a:avLst/>
+          </a:prstGeom>
+          <a:ln>
+            <a:tailEnd type="arrow"/>
+          </a:ln>
+        </p:spPr>
+        <p:style>
+          <a:lnRef idx="1">
+            <a:schemeClr val="accent1"/>
+          </a:lnRef>
+          <a:fillRef idx="0">
+            <a:schemeClr val="accent1"/>
+          </a:fillRef>
+          <a:effectRef idx="0">
+            <a:schemeClr val="accent1"/>
+          </a:effectRef>
+          <a:fontRef idx="minor">
+            <a:schemeClr val="tx1"/>
+          </a:fontRef>
+        </p:style>
+      </p:cxnSp>
+      <p:cxnSp>
+        <p:nvCxnSpPr>
+          <p:cNvPr id="7" name="Elbow Connector 6"/>
+          <p:cNvCxnSpPr/>
+          <p:nvPr/>
+        </p:nvCxnSpPr>
+        <p:spPr>
+          <a:xfrm flipV="1">
+            <a:off x="6324600" y="2895600"/>
+            <a:ext cx="900113" cy="647700"/>
+          </a:xfrm>
+          <a:prstGeom prst="bentConnector2">
+            <a:avLst/>
+          </a:prstGeom>
+          <a:ln>
+            <a:tailEnd type="arrow"/>
+          </a:ln>
+        </p:spPr>
+        <p:style>
+          <a:lnRef idx="1">
+            <a:schemeClr val="accent1"/>
+          </a:lnRef>
+          <a:fillRef idx="0">
+            <a:schemeClr val="accent1"/>
+          </a:fillRef>
+          <a:effectRef idx="0">
+            <a:schemeClr val="accent1"/>
+          </a:effectRef>
+          <a:fontRef idx="minor">
+            <a:schemeClr val="tx1"/>
+          </a:fontRef>
+        </p:style>
+      </p:cxnSp>
+      <p:cxnSp>
+        <p:nvCxnSpPr>
+          <p:cNvPr id="10" name="Straight Arrow Connector 9"/>
+          <p:cNvCxnSpPr>
+            <a:stCxn id="9222" idx="2"/>
+          </p:cNvCxnSpPr>
+          <p:nvPr/>
+        </p:nvCxnSpPr>
+        <p:spPr>
+          <a:xfrm flipH="1">
+            <a:off x="4500562" y="4191000"/>
+            <a:ext cx="1" cy="842963"/>
+          </a:xfrm>
+          <a:prstGeom prst="straightConnector1">
+            <a:avLst/>
+          </a:prstGeom>
+          <a:ln>
+            <a:tailEnd type="arrow"/>
+          </a:ln>
+        </p:spPr>
+        <p:style>
+          <a:lnRef idx="1">
+            <a:schemeClr val="accent1"/>
+          </a:lnRef>
+          <a:fillRef idx="0">
+            <a:schemeClr val="accent1"/>
+          </a:fillRef>
+          <a:effectRef idx="0">
+            <a:schemeClr val="accent1"/>
+          </a:effectRef>
+          <a:fontRef idx="minor">
+            <a:schemeClr val="tx1"/>
+          </a:fontRef>
+        </p:style>
+      </p:cxnSp>
+    </p:spTree>
+    <p:extLst>
+      <p:ext uri="{BB962C8B-B14F-4D97-AF65-F5344CB8AC3E}">
+        <p14:creationId xmlns:p14="http://schemas.microsoft.com/office/powerpoint/2010/main" val="2660466331"/>
+      </p:ext>
+    </p:extLst>
+  </p:cSld>
+  <p:clrMapOvr>
+    <a:masterClrMapping/>
+  </p:clrMapOvr>
+  <p:timing>
+    <p:tnLst>
+      <p:par>
+        <p:cTn id="1" dur="indefinite" restart="never" nodeType="tmRoot"/>
+      </p:par>
+    </p:tnLst>
+  </p:timing>
+</p:sld>
+</file>
+
+<file path=ppt/slides/slide7.xml><?xml version="1.0" encoding="utf-8"?>
+<p:sld xmlns:a="http://schemas.openxmlformats.org/drawingml/2006/main" xmlns:r="http://schemas.openxmlformats.org/officeDocument/2006/relationships" xmlns:p="http://schemas.openxmlformats.org/presentationml/2006/main">
+  <p:cSld>
+    <p:spTree>
+      <p:nvGrpSpPr>
+        <p:cNvPr id="1" name=""/>
+        <p:cNvGrpSpPr/>
+        <p:nvPr/>
+      </p:nvGrpSpPr>
+      <p:grpSpPr>
+        <a:xfrm>
+          <a:off x="0" y="0"/>
+          <a:ext cx="0" cy="0"/>
+          <a:chOff x="0" y="0"/>
+          <a:chExt cx="0" cy="0"/>
+        </a:xfrm>
+      </p:grpSpPr>
+      <p:sp>
+        <p:nvSpPr>
+          <p:cNvPr id="2" name="Title 1"/>
+          <p:cNvSpPr>
+            <a:spLocks noGrp="1"/>
+          </p:cNvSpPr>
+          <p:nvPr>
+            <p:ph type="ctrTitle"/>
+          </p:nvPr>
+        </p:nvSpPr>
+        <p:spPr>
+          <a:xfrm>
+            <a:off x="685800" y="2492375"/>
+            <a:ext cx="7772400" cy="1470025"/>
+          </a:xfrm>
+        </p:spPr>
+        <p:txBody>
+          <a:bodyPr>
+            <a:normAutofit fontScale="90000"/>
+          </a:bodyPr>
+          <a:lstStyle/>
+          <a:p>
+            <a:r>
+              <a:rPr lang="en-US" dirty="0" smtClean="0"/>
+              <a:t>Project – 1 :</a:t>
+            </a:r>
+            <a:br>
+              <a:rPr lang="en-US" dirty="0" smtClean="0"/>
+            </a:br>
+            <a:r>
+              <a:rPr lang="en-US" dirty="0" smtClean="0"/>
+              <a:t/>
+            </a:r>
+            <a:br>
+              <a:rPr lang="en-US" dirty="0" smtClean="0"/>
+            </a:br>
+            <a:r>
+              <a:rPr lang="en-IN" dirty="0" err="1" smtClean="0"/>
+              <a:t>drawr</a:t>
+            </a:r>
+            <a:r>
+              <a:rPr lang="en-IN" dirty="0" smtClean="0"/>
+              <a:t>-bootstrap</a:t>
+            </a:r>
+            <a:br>
+              <a:rPr lang="en-IN" dirty="0" smtClean="0"/>
+            </a:br>
+            <a:endParaRPr lang="en-IN" dirty="0"/>
+          </a:p>
+        </p:txBody>
+      </p:sp>
+    </p:spTree>
+    <p:extLst>
+      <p:ext uri="{BB962C8B-B14F-4D97-AF65-F5344CB8AC3E}">
+        <p14:creationId xmlns:p14="http://schemas.microsoft.com/office/powerpoint/2010/main" val="1373343633"/>
+      </p:ext>
+    </p:extLst>
+  </p:cSld>
+  <p:clrMapOvr>
+    <a:masterClrMapping/>
+  </p:clrMapOvr>
+  <p:timing>
+    <p:tnLst>
+      <p:par>
+        <p:cTn id="1" dur="indefinite" restart="never" nodeType="tmRoot"/>
+      </p:par>
+    </p:tnLst>
+  </p:timing>
+</p:sld>
+</file>
+
+<file path=ppt/slides/slide8.xml><?xml version="1.0" encoding="utf-8"?>
+<p:sld xmlns:a="http://schemas.openxmlformats.org/drawingml/2006/main" xmlns:r="http://schemas.openxmlformats.org/officeDocument/2006/relationships" xmlns:p="http://schemas.openxmlformats.org/presentationml/2006/main">
+  <p:cSld>
+    <p:spTree>
+      <p:nvGrpSpPr>
+        <p:cNvPr id="1" name=""/>
+        <p:cNvGrpSpPr/>
+        <p:nvPr/>
+      </p:nvGrpSpPr>
+      <p:grpSpPr>
+        <a:xfrm>
+          <a:off x="0" y="0"/>
+          <a:ext cx="0" cy="0"/>
+          <a:chOff x="0" y="0"/>
+          <a:chExt cx="0" cy="0"/>
+        </a:xfrm>
+      </p:grpSpPr>
+      <p:sp>
+        <p:nvSpPr>
+          <p:cNvPr id="2" name="Title 1"/>
+          <p:cNvSpPr>
+            <a:spLocks noGrp="1"/>
+          </p:cNvSpPr>
+          <p:nvPr>
+            <p:ph type="title"/>
+          </p:nvPr>
+        </p:nvSpPr>
+        <p:spPr/>
+        <p:txBody>
+          <a:bodyPr/>
+          <a:lstStyle/>
+          <a:p>
+            <a:r>
+              <a:rPr lang="en-IN" dirty="0" err="1" smtClean="0"/>
+              <a:t>drawr</a:t>
+            </a:r>
+            <a:r>
+              <a:rPr lang="en-IN" dirty="0" smtClean="0"/>
+              <a:t>-bootstrap</a:t>
+            </a:r>
+            <a:endParaRPr lang="en-IN" dirty="0"/>
+          </a:p>
+        </p:txBody>
+      </p:sp>
+      <p:sp>
+        <p:nvSpPr>
+          <p:cNvPr id="4" name="TextBox 3"/>
+          <p:cNvSpPr txBox="1"/>
+          <p:nvPr/>
+        </p:nvSpPr>
+        <p:spPr>
+          <a:xfrm>
+            <a:off x="3835437" y="5943600"/>
+            <a:ext cx="1269963" cy="369332"/>
+          </a:xfrm>
+          <a:prstGeom prst="rect">
+            <a:avLst/>
+          </a:prstGeom>
+          <a:noFill/>
+        </p:spPr>
+        <p:txBody>
+          <a:bodyPr wrap="none" rtlCol="0">
+            <a:spAutoFit/>
+          </a:bodyPr>
+          <a:lstStyle/>
+          <a:p>
+            <a:r>
+              <a:rPr lang="en-US" dirty="0" smtClean="0"/>
+              <a:t>First Screen</a:t>
+            </a:r>
+            <a:endParaRPr lang="en-IN" dirty="0"/>
+          </a:p>
+        </p:txBody>
+      </p:sp>
+      <p:pic>
+        <p:nvPicPr>
+          <p:cNvPr id="2050" name="Picture 2" descr="D:\Informatics\Seminar\My Workspace\Seminar_Repository\presentation\Images\first screen.png"/>
+          <p:cNvPicPr>
+            <a:picLocks noChangeAspect="1" noChangeArrowheads="1"/>
+          </p:cNvPicPr>
+          <p:nvPr/>
+        </p:nvPicPr>
+        <p:blipFill>
+          <a:blip r:embed="rId2">
+            <a:extLst>
+              <a:ext uri="{28A0092B-C50C-407E-A947-70E740481C1C}">
+                <a14:useLocalDpi xmlns:a14="http://schemas.microsoft.com/office/drawing/2010/main" val="0"/>
+              </a:ext>
+            </a:extLst>
+          </a:blip>
+          <a:srcRect/>
+          <a:stretch>
+            <a:fillRect/>
+          </a:stretch>
+        </p:blipFill>
+        <p:spPr bwMode="auto">
+          <a:xfrm>
+            <a:off x="838200" y="1304365"/>
+            <a:ext cx="7239000" cy="4639235"/>
+          </a:xfrm>
+          <a:prstGeom prst="rect">
+            <a:avLst/>
+          </a:prstGeom>
+          <a:noFill/>
+          <a:extLst>
+            <a:ext uri="{909E8E84-426E-40DD-AFC4-6F175D3DCCD1}">
+              <a14:hiddenFill xmlns:a14="http://schemas.microsoft.com/office/drawing/2010/main">
+                <a:solidFill>
+                  <a:srgbClr val="FFFFFF"/>
+                </a:solidFill>
+              </a14:hiddenFill>
+            </a:ext>
+          </a:extLst>
+        </p:spPr>
+      </p:pic>
+      <p:pic>
+        <p:nvPicPr>
+          <p:cNvPr id="2052" name="Picture 4" descr="D:\Informatics\Seminar\My Workspace\Seminar_Repository\presentation\Images\cartoon.jpg"/>
+          <p:cNvPicPr>
+            <a:picLocks noChangeAspect="1" noChangeArrowheads="1"/>
+          </p:cNvPicPr>
+          <p:nvPr/>
+        </p:nvPicPr>
+        <p:blipFill>
+          <a:blip r:embed="rId3">
+            <a:extLst>
+              <a:ext uri="{28A0092B-C50C-407E-A947-70E740481C1C}">
+                <a14:useLocalDpi xmlns:a14="http://schemas.microsoft.com/office/drawing/2010/main" val="0"/>
+              </a:ext>
+            </a:extLst>
+          </a:blip>
+          <a:srcRect/>
+          <a:stretch>
+            <a:fillRect/>
+          </a:stretch>
+        </p:blipFill>
+        <p:spPr bwMode="auto">
+          <a:xfrm>
+            <a:off x="4456978" y="2209800"/>
+            <a:ext cx="1914525" cy="1838325"/>
+          </a:xfrm>
+          <a:prstGeom prst="rect">
+            <a:avLst/>
+          </a:prstGeom>
+          <a:noFill/>
+          <a:extLst>
+            <a:ext uri="{909E8E84-426E-40DD-AFC4-6F175D3DCCD1}">
+              <a14:hiddenFill xmlns:a14="http://schemas.microsoft.com/office/drawing/2010/main">
+                <a:solidFill>
+                  <a:srgbClr val="FFFFFF"/>
+                </a:solidFill>
+              </a14:hiddenFill>
+            </a:ext>
+          </a:extLst>
+        </p:spPr>
+      </p:pic>
+    </p:spTree>
+    <p:extLst>
+      <p:ext uri="{BB962C8B-B14F-4D97-AF65-F5344CB8AC3E}">
+        <p14:creationId xmlns:p14="http://schemas.microsoft.com/office/powerpoint/2010/main" val="462294005"/>
+      </p:ext>
+    </p:extLst>
+  </p:cSld>
+  <p:clrMapOvr>
+    <a:masterClrMapping/>
+  </p:clrMapOvr>
+  <p:timing>
+    <p:tnLst>
+      <p:par>
+        <p:cTn id="1" dur="indefinite" restart="never" nodeType="tmRoot"/>
+      </p:par>
+    </p:tnLst>
+  </p:timing>
+</p:sld>
+</file>
+
+<file path=ppt/slides/slide9.xml><?xml version="1.0" encoding="utf-8"?>
+<p:sld xmlns:a="http://schemas.openxmlformats.org/drawingml/2006/main" xmlns:r="http://schemas.openxmlformats.org/officeDocument/2006/relationships" xmlns:p="http://schemas.openxmlformats.org/presentationml/2006/main">
+  <p:cSld>
+    <p:spTree>
+      <p:nvGrpSpPr>
+        <p:cNvPr id="1" name=""/>
+        <p:cNvGrpSpPr/>
+        <p:nvPr/>
+      </p:nvGrpSpPr>
+      <p:grpSpPr>
+        <a:xfrm>
+          <a:off x="0" y="0"/>
+          <a:ext cx="0" cy="0"/>
+          <a:chOff x="0" y="0"/>
+          <a:chExt cx="0" cy="0"/>
+        </a:xfrm>
+      </p:grpSpPr>
+      <p:sp>
+        <p:nvSpPr>
+          <p:cNvPr id="2" name="Title 1"/>
+          <p:cNvSpPr>
+            <a:spLocks noGrp="1"/>
+          </p:cNvSpPr>
+          <p:nvPr>
+            <p:ph type="title"/>
+          </p:nvPr>
+        </p:nvSpPr>
+        <p:spPr/>
+        <p:txBody>
+          <a:bodyPr/>
+          <a:lstStyle/>
+          <a:p>
+            <a:r>
+              <a:rPr lang="en-IN" dirty="0" err="1" smtClean="0"/>
+              <a:t>drawr</a:t>
+            </a:r>
+            <a:r>
+              <a:rPr lang="en-IN" dirty="0" smtClean="0"/>
+              <a:t>-bootstrap: features</a:t>
+            </a:r>
+            <a:endParaRPr lang="en-IN" dirty="0"/>
+          </a:p>
+        </p:txBody>
+      </p:sp>
+      <p:sp>
+        <p:nvSpPr>
+          <p:cNvPr id="3" name="Content Placeholder 2"/>
+          <p:cNvSpPr>
+            <a:spLocks noGrp="1"/>
+          </p:cNvSpPr>
+          <p:nvPr>
+            <p:ph idx="1"/>
+          </p:nvPr>
+        </p:nvSpPr>
+        <p:spPr/>
+        <p:txBody>
+          <a:bodyPr>
+            <a:normAutofit/>
+          </a:bodyPr>
+          <a:lstStyle/>
+          <a:p>
+            <a:r>
+              <a:rPr lang="en-US" dirty="0" smtClean="0"/>
+              <a:t>Customizable drawing tool</a:t>
+            </a:r>
+          </a:p>
+          <a:p>
+            <a:r>
+              <a:rPr lang="en-US" dirty="0" smtClean="0"/>
+              <a:t>Toolbar</a:t>
+            </a:r>
+          </a:p>
+          <a:p>
+            <a:pPr lvl="1"/>
+            <a:r>
+              <a:rPr lang="en-US" dirty="0" smtClean="0"/>
+              <a:t>Brush/Eraser thickness</a:t>
+            </a:r>
+          </a:p>
+          <a:p>
+            <a:pPr lvl="1"/>
+            <a:r>
+              <a:rPr lang="en-US" dirty="0" smtClean="0"/>
+              <a:t>Color Palette</a:t>
+            </a:r>
+          </a:p>
+          <a:p>
+            <a:pPr lvl="1"/>
+            <a:r>
+              <a:rPr lang="en-US" dirty="0" smtClean="0"/>
+              <a:t>Add new color</a:t>
+            </a:r>
+          </a:p>
+          <a:p>
+            <a:pPr lvl="1"/>
+            <a:r>
+              <a:rPr lang="en-US" dirty="0" smtClean="0"/>
+              <a:t>Remove a color</a:t>
+            </a:r>
+          </a:p>
+          <a:p>
+            <a:pPr lvl="1"/>
+            <a:r>
+              <a:rPr lang="en-US" dirty="0" smtClean="0"/>
+              <a:t>Clear canvas</a:t>
+            </a:r>
+          </a:p>
+          <a:p>
+            <a:pPr lvl="1"/>
+            <a:r>
+              <a:rPr lang="en-US" dirty="0" smtClean="0"/>
+              <a:t>Save canvas</a:t>
+            </a:r>
+          </a:p>
+          <a:p>
+            <a:pPr marL="457200" lvl="1" indent="0">
+              <a:buNone/>
+            </a:pPr>
+            <a:endParaRPr lang="en-US" dirty="0" smtClean="0"/>
+          </a:p>
+          <a:p>
+            <a:endParaRPr lang="en-IN" dirty="0"/>
+          </a:p>
+        </p:txBody>
+      </p:sp>
+      <p:pic>
+        <p:nvPicPr>
+          <p:cNvPr id="4" name="Picture 2" descr="D:\Informatics\Seminar\My Workspace\Seminar_Repository\presentation\Images\first screen.png"/>
+          <p:cNvPicPr>
+            <a:picLocks noChangeAspect="1" noChangeArrowheads="1"/>
+          </p:cNvPicPr>
+          <p:nvPr/>
+        </p:nvPicPr>
+        <p:blipFill>
+          <a:blip r:embed="rId2">
+            <a:extLst>
+              <a:ext uri="{28A0092B-C50C-407E-A947-70E740481C1C}">
+                <a14:useLocalDpi xmlns:a14="http://schemas.microsoft.com/office/drawing/2010/main" val="0"/>
+              </a:ext>
+            </a:extLst>
+          </a:blip>
+          <a:srcRect/>
+          <a:stretch>
+            <a:fillRect/>
+          </a:stretch>
+        </p:blipFill>
+        <p:spPr bwMode="auto">
+          <a:xfrm>
+            <a:off x="3598333" y="3276600"/>
+            <a:ext cx="5469467" cy="3505200"/>
+          </a:xfrm>
+          <a:prstGeom prst="rect">
+            <a:avLst/>
+          </a:prstGeom>
+          <a:noFill/>
+          <a:extLst>
+            <a:ext uri="{909E8E84-426E-40DD-AFC4-6F175D3DCCD1}">
+              <a14:hiddenFill xmlns:a14="http://schemas.microsoft.com/office/drawing/2010/main">
+                <a:solidFill>
+                  <a:srgbClr val="FFFFFF"/>
+                </a:solidFill>
+              </a14:hiddenFill>
+            </a:ext>
+          </a:extLst>
+        </p:spPr>
+      </p:pic>
+      <p:pic>
+        <p:nvPicPr>
+          <p:cNvPr id="5" name="Picture 4" descr="D:\Informatics\Seminar\My Workspace\Seminar_Repository\presentation\Images\cartoon.jpg"/>
+          <p:cNvPicPr>
+            <a:picLocks noChangeAspect="1" noChangeArrowheads="1"/>
+          </p:cNvPicPr>
+          <p:nvPr/>
+        </p:nvPicPr>
+        <p:blipFill>
+          <a:blip r:embed="rId3">
+            <a:extLst>
+              <a:ext uri="{28A0092B-C50C-407E-A947-70E740481C1C}">
+                <a14:useLocalDpi xmlns:a14="http://schemas.microsoft.com/office/drawing/2010/main" val="0"/>
+              </a:ext>
+            </a:extLst>
+          </a:blip>
+          <a:srcRect/>
+          <a:stretch>
+            <a:fillRect/>
+          </a:stretch>
+        </p:blipFill>
+        <p:spPr bwMode="auto">
+          <a:xfrm>
+            <a:off x="6285778" y="4038600"/>
+            <a:ext cx="1334222" cy="1281119"/>
+          </a:xfrm>
+          <a:prstGeom prst="rect">
+            <a:avLst/>
+          </a:prstGeom>
+          <a:noFill/>
+          <a:extLst>
+            <a:ext uri="{909E8E84-426E-40DD-AFC4-6F175D3DCCD1}">
+              <a14:hiddenFill xmlns:a14="http://schemas.microsoft.com/office/drawing/2010/main">
+                <a:solidFill>
+                  <a:srgbClr val="FFFFFF"/>
+                </a:solidFill>
+              </a14:hiddenFill>
+            </a:ext>
+          </a:extLst>
+        </p:spPr>
+      </p:pic>
+    </p:spTree>
+    <p:extLst>
+      <p:ext uri="{BB962C8B-B14F-4D97-AF65-F5344CB8AC3E}">
+        <p14:creationId xmlns:p14="http://schemas.microsoft.com/office/powerpoint/2010/main" val="2491645263"/>
       </p:ext>
     </p:extLst>
   </p:cSld>
@@ -4318,4 +7278,289 @@
   <a:objectDefaults/>
   <a:extraClrSchemeLst/>
 </a:theme>
+</file>
+
+<file path=ppt/theme/theme2.xml><?xml version="1.0" encoding="utf-8"?>
+<a:theme xmlns:a="http://schemas.openxmlformats.org/drawingml/2006/main" name="Office Theme">
+  <a:themeElements>
+    <a:clrScheme name="Office">
+      <a:dk1>
+        <a:sysClr val="windowText" lastClr="000000"/>
+      </a:dk1>
+      <a:lt1>
+        <a:sysClr val="window" lastClr="FFFFFF"/>
+      </a:lt1>
+      <a:dk2>
+        <a:srgbClr val="1F497D"/>
+      </a:dk2>
+      <a:lt2>
+        <a:srgbClr val="EEECE1"/>
+      </a:lt2>
+      <a:accent1>
+        <a:srgbClr val="4F81BD"/>
+      </a:accent1>
+      <a:accent2>
+        <a:srgbClr val="C0504D"/>
+      </a:accent2>
+      <a:accent3>
+        <a:srgbClr val="9BBB59"/>
+      </a:accent3>
+      <a:accent4>
+        <a:srgbClr val="8064A2"/>
+      </a:accent4>
+      <a:accent5>
+        <a:srgbClr val="4BACC6"/>
+      </a:accent5>
+      <a:accent6>
+        <a:srgbClr val="F79646"/>
+      </a:accent6>
+      <a:hlink>
+        <a:srgbClr val="0000FF"/>
+      </a:hlink>
+      <a:folHlink>
+        <a:srgbClr val="800080"/>
+      </a:folHlink>
+    </a:clrScheme>
+    <a:fontScheme name="Office">
+      <a:majorFont>
+        <a:latin typeface="Calibri"/>
+        <a:ea typeface=""/>
+        <a:cs typeface=""/>
+        <a:font script="Jpan" typeface="ＭＳ Ｐゴシック"/>
+        <a:font script="Hang" typeface="맑은 고딕"/>
+        <a:font script="Hans" typeface="宋体"/>
+        <a:font script="Hant" typeface="新細明體"/>
+        <a:font script="Arab" typeface="Times New Roman"/>
+        <a:font script="Hebr" typeface="Times New Roman"/>
+        <a:font script="Thai" typeface="Angsana New"/>
+        <a:font script="Ethi" typeface="Nyala"/>
+        <a:font script="Beng" typeface="Vrinda"/>
+        <a:font script="Gujr" typeface="Shruti"/>
+        <a:font script="Khmr" typeface="MoolBoran"/>
+        <a:font script="Knda" typeface="Tunga"/>
+        <a:font script="Guru" typeface="Raavi"/>
+        <a:font script="Cans" typeface="Euphemia"/>
+        <a:font script="Cher" typeface="Plantagenet Cherokee"/>
+        <a:font script="Yiii" typeface="Microsoft Yi Baiti"/>
+        <a:font script="Tibt" typeface="Microsoft Himalaya"/>
+        <a:font script="Thaa" typeface="MV Boli"/>
+        <a:font script="Deva" typeface="Mangal"/>
+        <a:font script="Telu" typeface="Gautami"/>
+        <a:font script="Taml" typeface="Latha"/>
+        <a:font script="Syrc" typeface="Estrangelo Edessa"/>
+        <a:font script="Orya" typeface="Kalinga"/>
+        <a:font script="Mlym" typeface="Kartika"/>
+        <a:font script="Laoo" typeface="DokChampa"/>
+        <a:font script="Sinh" typeface="Iskoola Pota"/>
+        <a:font script="Mong" typeface="Mongolian Baiti"/>
+        <a:font script="Viet" typeface="Times New Roman"/>
+        <a:font script="Uigh" typeface="Microsoft Uighur"/>
+        <a:font script="Geor" typeface="Sylfaen"/>
+      </a:majorFont>
+      <a:minorFont>
+        <a:latin typeface="Calibri"/>
+        <a:ea typeface=""/>
+        <a:cs typeface=""/>
+        <a:font script="Jpan" typeface="ＭＳ Ｐゴシック"/>
+        <a:font script="Hang" typeface="맑은 고딕"/>
+        <a:font script="Hans" typeface="宋体"/>
+        <a:font script="Hant" typeface="新細明體"/>
+        <a:font script="Arab" typeface="Arial"/>
+        <a:font script="Hebr" typeface="Arial"/>
+        <a:font script="Thai" typeface="Cordia New"/>
+        <a:font script="Ethi" typeface="Nyala"/>
+        <a:font script="Beng" typeface="Vrinda"/>
+        <a:font script="Gujr" typeface="Shruti"/>
+        <a:font script="Khmr" typeface="DaunPenh"/>
+        <a:font script="Knda" typeface="Tunga"/>
+        <a:font script="Guru" typeface="Raavi"/>
+        <a:font script="Cans" typeface="Euphemia"/>
+        <a:font script="Cher" typeface="Plantagenet Cherokee"/>
+        <a:font script="Yiii" typeface="Microsoft Yi Baiti"/>
+        <a:font script="Tibt" typeface="Microsoft Himalaya"/>
+        <a:font script="Thaa" typeface="MV Boli"/>
+        <a:font script="Deva" typeface="Mangal"/>
+        <a:font script="Telu" typeface="Gautami"/>
+        <a:font script="Taml" typeface="Latha"/>
+        <a:font script="Syrc" typeface="Estrangelo Edessa"/>
+        <a:font script="Orya" typeface="Kalinga"/>
+        <a:font script="Mlym" typeface="Kartika"/>
+        <a:font script="Laoo" typeface="DokChampa"/>
+        <a:font script="Sinh" typeface="Iskoola Pota"/>
+        <a:font script="Mong" typeface="Mongolian Baiti"/>
+        <a:font script="Viet" typeface="Arial"/>
+        <a:font script="Uigh" typeface="Microsoft Uighur"/>
+        <a:font script="Geor" typeface="Sylfaen"/>
+      </a:minorFont>
+    </a:fontScheme>
+    <a:fmtScheme name="Office">
+      <a:fillStyleLst>
+        <a:solidFill>
+          <a:schemeClr val="phClr"/>
+        </a:solidFill>
+        <a:gradFill rotWithShape="1">
+          <a:gsLst>
+            <a:gs pos="0">
+              <a:schemeClr val="phClr">
+                <a:tint val="50000"/>
+                <a:satMod val="300000"/>
+              </a:schemeClr>
+            </a:gs>
+            <a:gs pos="35000">
+              <a:schemeClr val="phClr">
+                <a:tint val="37000"/>
+                <a:satMod val="300000"/>
+              </a:schemeClr>
+            </a:gs>
+            <a:gs pos="100000">
+              <a:schemeClr val="phClr">
+                <a:tint val="15000"/>
+                <a:satMod val="350000"/>
+              </a:schemeClr>
+            </a:gs>
+          </a:gsLst>
+          <a:lin ang="16200000" scaled="1"/>
+        </a:gradFill>
+        <a:gradFill rotWithShape="1">
+          <a:gsLst>
+            <a:gs pos="0">
+              <a:schemeClr val="phClr">
+                <a:shade val="51000"/>
+                <a:satMod val="130000"/>
+              </a:schemeClr>
+            </a:gs>
+            <a:gs pos="80000">
+              <a:schemeClr val="phClr">
+                <a:shade val="93000"/>
+                <a:satMod val="130000"/>
+              </a:schemeClr>
+            </a:gs>
+            <a:gs pos="100000">
+              <a:schemeClr val="phClr">
+                <a:shade val="94000"/>
+                <a:satMod val="135000"/>
+              </a:schemeClr>
+            </a:gs>
+          </a:gsLst>
+          <a:lin ang="16200000" scaled="0"/>
+        </a:gradFill>
+      </a:fillStyleLst>
+      <a:lnStyleLst>
+        <a:ln w="9525" cap="flat" cmpd="sng" algn="ctr">
+          <a:solidFill>
+            <a:schemeClr val="phClr">
+              <a:shade val="95000"/>
+              <a:satMod val="105000"/>
+            </a:schemeClr>
+          </a:solidFill>
+          <a:prstDash val="solid"/>
+        </a:ln>
+        <a:ln w="25400" cap="flat" cmpd="sng" algn="ctr">
+          <a:solidFill>
+            <a:schemeClr val="phClr"/>
+          </a:solidFill>
+          <a:prstDash val="solid"/>
+        </a:ln>
+        <a:ln w="38100" cap="flat" cmpd="sng" algn="ctr">
+          <a:solidFill>
+            <a:schemeClr val="phClr"/>
+          </a:solidFill>
+          <a:prstDash val="solid"/>
+        </a:ln>
+      </a:lnStyleLst>
+      <a:effectStyleLst>
+        <a:effectStyle>
+          <a:effectLst>
+            <a:outerShdw blurRad="40000" dist="20000" dir="5400000" rotWithShape="0">
+              <a:srgbClr val="000000">
+                <a:alpha val="38000"/>
+              </a:srgbClr>
+            </a:outerShdw>
+          </a:effectLst>
+        </a:effectStyle>
+        <a:effectStyle>
+          <a:effectLst>
+            <a:outerShdw blurRad="40000" dist="23000" dir="5400000" rotWithShape="0">
+              <a:srgbClr val="000000">
+                <a:alpha val="35000"/>
+              </a:srgbClr>
+            </a:outerShdw>
+          </a:effectLst>
+        </a:effectStyle>
+        <a:effectStyle>
+          <a:effectLst>
+            <a:outerShdw blurRad="40000" dist="23000" dir="5400000" rotWithShape="0">
+              <a:srgbClr val="000000">
+                <a:alpha val="35000"/>
+              </a:srgbClr>
+            </a:outerShdw>
+          </a:effectLst>
+          <a:scene3d>
+            <a:camera prst="orthographicFront">
+              <a:rot lat="0" lon="0" rev="0"/>
+            </a:camera>
+            <a:lightRig rig="threePt" dir="t">
+              <a:rot lat="0" lon="0" rev="1200000"/>
+            </a:lightRig>
+          </a:scene3d>
+          <a:sp3d>
+            <a:bevelT w="63500" h="25400"/>
+          </a:sp3d>
+        </a:effectStyle>
+      </a:effectStyleLst>
+      <a:bgFillStyleLst>
+        <a:solidFill>
+          <a:schemeClr val="phClr"/>
+        </a:solidFill>
+        <a:gradFill rotWithShape="1">
+          <a:gsLst>
+            <a:gs pos="0">
+              <a:schemeClr val="phClr">
+                <a:tint val="40000"/>
+                <a:satMod val="350000"/>
+              </a:schemeClr>
+            </a:gs>
+            <a:gs pos="40000">
+              <a:schemeClr val="phClr">
+                <a:tint val="45000"/>
+                <a:shade val="99000"/>
+                <a:satMod val="350000"/>
+              </a:schemeClr>
+            </a:gs>
+            <a:gs pos="100000">
+              <a:schemeClr val="phClr">
+                <a:shade val="20000"/>
+                <a:satMod val="255000"/>
+              </a:schemeClr>
+            </a:gs>
+          </a:gsLst>
+          <a:path path="circle">
+            <a:fillToRect l="50000" t="-80000" r="50000" b="180000"/>
+          </a:path>
+        </a:gradFill>
+        <a:gradFill rotWithShape="1">
+          <a:gsLst>
+            <a:gs pos="0">
+              <a:schemeClr val="phClr">
+                <a:tint val="80000"/>
+                <a:satMod val="300000"/>
+              </a:schemeClr>
+            </a:gs>
+            <a:gs pos="100000">
+              <a:schemeClr val="phClr">
+                <a:shade val="30000"/>
+                <a:satMod val="200000"/>
+              </a:schemeClr>
+            </a:gs>
+          </a:gsLst>
+          <a:path path="circle">
+            <a:fillToRect l="50000" t="50000" r="50000" b="50000"/>
+          </a:path>
+        </a:gradFill>
+      </a:bgFillStyleLst>
+    </a:fmtScheme>
+  </a:themeElements>
+  <a:objectDefaults/>
+  <a:extraClrSchemeLst/>
+</a:theme>
 </file>
</xml_diff>